<commit_message>
Live Lecture 2 Upate
</commit_message>
<xml_diff>
--- a/lectures/lecture-02/Lecture-Live C00/Lecture 02 - Lecture.pptx
+++ b/lectures/lecture-02/Lecture-Live C00/Lecture 02 - Lecture.pptx
@@ -142,6 +142,616 @@
     </p:ext>
   </p:extLst>
 </p:presentation>
+</file>
+
+<file path=ppt/ink/ink1.xml><?xml version="1.0" encoding="utf-8"?>
+<inkml:ink xmlns:inkml="http://www.w3.org/2003/InkML">
+  <inkml:definitions>
+    <inkml:context xml:id="ctx0">
+      <inkml:inkSource xml:id="inkSrc0">
+        <inkml:traceFormat>
+          <inkml:channel name="X" type="integer" min="-2.14748E9" max="2.14748E9" units="cm"/>
+          <inkml:channel name="Y" type="integer" min="-2.14748E9" max="2.14748E9" units="cm"/>
+          <inkml:channel name="F" type="integer" max="32767" units="dev"/>
+          <inkml:channel name="OA" type="integer" max="360" units="deg"/>
+          <inkml:channel name="OE" type="integer" max="90" units="deg"/>
+        </inkml:traceFormat>
+        <inkml:channelProperties>
+          <inkml:channelProperty channel="X" name="resolution" value="1000" units="1/cm"/>
+          <inkml:channelProperty channel="Y" name="resolution" value="1000" units="1/cm"/>
+          <inkml:channelProperty channel="F" name="resolution" value="0" units="1/dev"/>
+          <inkml:channelProperty channel="OA" name="resolution" value="1000" units="1/deg"/>
+          <inkml:channelProperty channel="OE" name="resolution" value="1000" units="1/deg"/>
+        </inkml:channelProperties>
+      </inkml:inkSource>
+      <inkml:timestamp xml:id="ts0" timeString="2021-01-06T19:00:28.811"/>
+    </inkml:context>
+    <inkml:brush xml:id="br0">
+      <inkml:brushProperty name="width" value="0.05" units="cm"/>
+      <inkml:brushProperty name="height" value="0.05" units="cm"/>
+      <inkml:brushProperty name="color" value="#E71224"/>
+    </inkml:brush>
+  </inkml:definitions>
+  <inkml:trace contextRef="#ctx0" brushRef="#br0">100 114 7368 0 0,'-53'5'1621'0'0,"19"-5"3203"0"0,28 0-3301 0 0,5 0-1397 0 0,1 0 1 0 0,0 1 0 0 0,0-1-1 0 0,0 0 1 0 0,-1 0 0 0 0,1 0 0 0 0,0 0-1 0 0,0 0 1 0 0,0 0 0 0 0,-1 0-1 0 0,1 0 1 0 0,0 0 0 0 0,0 0 0 0 0,0 0-1 0 0,-1 0 1 0 0,1 0 0 0 0,0 0-1 0 0,0 0 1 0 0,0 0 0 0 0,0-1 0 0 0,-1 1-1 0 0,1 0 1 0 0,0 0 0 0 0,0 0-1 0 0,0 0 1 0 0,-1 0 0 0 0,1 0 0 0 0,0-1 126 0 0,0 1-126 0 0,0 0-1 0 0,0 0 1 0 0,0 0 0 0 0,-1 0 0 0 0,1-1-1 0 0,0 1 1 0 0,0 0 0 0 0,6-6 1065 0 0,14-3-856 0 0,-7 4-63 0 0,0 1 0 0 0,0 0 0 0 0,1 2 0 0 0,25-4 0 0 0,57 4 480 0 0,-89 2-677 0 0,644-15 3186 0 0,-325-16-2051 0 0,-37 4-630 0 0,-190 21-202 0 0,127 10 1 0 0,-205-3-316 0 0,-4 0 47 0 0,1 0-1 0 0,0 2 0 0 0,25 6 0 0 0,-3 3 38 0 0,-25-7-59 0 0,-15-5-87 0 0,0 0 0 0 0,0 0 1 0 0,1 0-1 0 0,-1 0 0 0 0,0 0 0 0 0,1 0 0 0 0,-1 0 0 0 0,0 0 0 0 0,1 0 0 0 0,-1 0 0 0 0,0 0 0 0 0,0 0 0 0 0,1 0 0 0 0,-1 0 0 0 0,0 0 0 0 0,1 0 0 0 0,-1 0 0 0 0,0 0 0 0 0,0 0 0 0 0,1 0 0 0 0,-1 0 0 0 0,0-1 0 0 0,1 1 0 0 0,-1 0 0 0 0,0 0 0 0 0,0 0 0 0 0,1-1 0 0 0,-1 1 0 0 0,0 0 1 0 0,0 0-1 0 0,0 0 0 0 0,1-1 0 0 0,3-4 68 0 0,-1 0-16 0 0,-2 5-88 0 0,-1-1-1 0 0,1 0 0 0 0,-1 0 0 0 0,0 0 0 0 0,0 0 0 0 0,1 0 1 0 0,-1 1-1 0 0,0-1 0 0 0,0 0 0 0 0,0 0 0 0 0,0 0 0 0 0,0 0 0 0 0,0-1 1 0 0</inkml:trace>
+</inkml:ink>
+</file>
+
+<file path=ppt/ink/ink10.xml><?xml version="1.0" encoding="utf-8"?>
+<inkml:ink xmlns:inkml="http://www.w3.org/2003/InkML">
+  <inkml:definitions>
+    <inkml:context xml:id="ctx0">
+      <inkml:inkSource xml:id="inkSrc0">
+        <inkml:traceFormat>
+          <inkml:channel name="X" type="integer" min="-2.14748E9" max="2.14748E9" units="cm"/>
+          <inkml:channel name="Y" type="integer" min="-2.14748E9" max="2.14748E9" units="cm"/>
+          <inkml:channel name="F" type="integer" max="32767" units="dev"/>
+          <inkml:channel name="OA" type="integer" max="360" units="deg"/>
+          <inkml:channel name="OE" type="integer" max="90" units="deg"/>
+        </inkml:traceFormat>
+        <inkml:channelProperties>
+          <inkml:channelProperty channel="X" name="resolution" value="1000" units="1/cm"/>
+          <inkml:channelProperty channel="Y" name="resolution" value="1000" units="1/cm"/>
+          <inkml:channelProperty channel="F" name="resolution" value="0" units="1/dev"/>
+          <inkml:channelProperty channel="OA" name="resolution" value="1000" units="1/deg"/>
+          <inkml:channelProperty channel="OE" name="resolution" value="1000" units="1/deg"/>
+        </inkml:channelProperties>
+      </inkml:inkSource>
+      <inkml:timestamp xml:id="ts0" timeString="2021-01-06T19:01:19.629"/>
+    </inkml:context>
+    <inkml:brush xml:id="br0">
+      <inkml:brushProperty name="width" value="0.05" units="cm"/>
+      <inkml:brushProperty name="height" value="0.05" units="cm"/>
+      <inkml:brushProperty name="color" value="#E71224"/>
+    </inkml:brush>
+  </inkml:definitions>
+  <inkml:trace contextRef="#ctx0" brushRef="#br0">79 1 18311 0 0,'-6'3'258'0'0,"1"1"0"0"0,-1 1-1 0 0,1-1 1 0 0,0 1-1 0 0,0 0 1 0 0,0 0-1 0 0,0 0 1 0 0,1 1-1 0 0,0 0 1 0 0,1 0 0 0 0,-1 0-1 0 0,1 0 1 0 0,0 0-1 0 0,0 1 1 0 0,1-1-1 0 0,-3 14 1 0 0,3-15-69 0 0,1 1 1 0 0,0-1-1 0 0,1 1 0 0 0,-1-1 0 0 0,1 1 1 0 0,0-1-1 0 0,0 1 0 0 0,1 0 1 0 0,2 10-1 0 0,-2-12-107 0 0,0-1 1 0 0,0 1-1 0 0,1 0 1 0 0,0-1-1 0 0,-1 1 1 0 0,1-1-1 0 0,0 0 0 0 0,1 0 1 0 0,-1 1-1 0 0,1-1 1 0 0,-1-1-1 0 0,1 1 1 0 0,0 0-1 0 0,0-1 0 0 0,4 4 1 0 0,3-1 71 0 0,0 1 0 0 0,1-1 0 0 0,-1-1-1 0 0,1 0 1 0 0,15 4 0 0 0,56 6 792 0 0,-12-2-1 0 0,-66-11-853 0 0,0 0 0 0 0,1 0 0 0 0,-1 1-1 0 0,0 0 1 0 0,5 2 0 0 0,-8-4-75 0 0,0 1 0 0 0,-1-1 0 0 0,1 1 0 0 0,0-1 1 0 0,0 1-1 0 0,-1 0 0 0 0,1-1 0 0 0,0 1 0 0 0,-1 0 0 0 0,1-1 1 0 0,0 1-1 0 0,-1 0 0 0 0,1-1 0 0 0,-1 1 0 0 0,1 0 0 0 0,-1 0 1 0 0,0 0-1 0 0,1 0 0 0 0,-1 0 0 0 0,0 0 0 0 0,1-1 0 0 0,-1 1 1 0 0,0 0-1 0 0,0 0 0 0 0,0 0 0 0 0,0 0 0 0 0,0 0 0 0 0,0 0 1 0 0,0 1-1 0 0,-2 3 9 0 0,0 1 1 0 0,-1-1 0 0 0,1 0-1 0 0,-1 0 1 0 0,0 0 0 0 0,0-1-1 0 0,0 1 1 0 0,-1-1 0 0 0,0 0 0 0 0,1 0-1 0 0,-8 6 1 0 0,-7 4 20 0 0,-29 18 1 0 0,30-20-45 0 0,-20 9-781 0 0,-60 28 0 0 0,66-35-747 0 0</inkml:trace>
+</inkml:ink>
+</file>
+
+<file path=ppt/ink/ink11.xml><?xml version="1.0" encoding="utf-8"?>
+<inkml:ink xmlns:inkml="http://www.w3.org/2003/InkML">
+  <inkml:definitions>
+    <inkml:context xml:id="ctx0">
+      <inkml:inkSource xml:id="inkSrc0">
+        <inkml:traceFormat>
+          <inkml:channel name="X" type="integer" min="-2.14748E9" max="2.14748E9" units="cm"/>
+          <inkml:channel name="Y" type="integer" min="-2.14748E9" max="2.14748E9" units="cm"/>
+          <inkml:channel name="F" type="integer" max="32767" units="dev"/>
+          <inkml:channel name="OA" type="integer" max="360" units="deg"/>
+          <inkml:channel name="OE" type="integer" max="90" units="deg"/>
+        </inkml:traceFormat>
+        <inkml:channelProperties>
+          <inkml:channelProperty channel="X" name="resolution" value="1000" units="1/cm"/>
+          <inkml:channelProperty channel="Y" name="resolution" value="1000" units="1/cm"/>
+          <inkml:channelProperty channel="F" name="resolution" value="0" units="1/dev"/>
+          <inkml:channelProperty channel="OA" name="resolution" value="1000" units="1/deg"/>
+          <inkml:channelProperty channel="OE" name="resolution" value="1000" units="1/deg"/>
+        </inkml:channelProperties>
+      </inkml:inkSource>
+      <inkml:timestamp xml:id="ts0" timeString="2021-01-06T19:01:20.073"/>
+    </inkml:context>
+    <inkml:brush xml:id="br0">
+      <inkml:brushProperty name="width" value="0.05" units="cm"/>
+      <inkml:brushProperty name="height" value="0.05" units="cm"/>
+      <inkml:brushProperty name="color" value="#E71224"/>
+    </inkml:brush>
+  </inkml:definitions>
+  <inkml:trace contextRef="#ctx0" brushRef="#br0">33 221 9216 0 0,'-28'0'5425'0'0,"23"-7"-2215"0"0,7-1-2711 0 0,-1 1-1 0 0,1 0 1 0 0,0 0-1 0 0,0 1 1 0 0,1-1-1 0 0,-1 0 1 0 0,8-10-1 0 0,-3 3 54 0 0,0-2-98 0 0,1 0 0 0 0,0 1-1 0 0,1 0 1 0 0,1 1 0 0 0,0 0 0 0 0,22-23-1 0 0,-32 37-435 0 0,1-1 0 0 0,-1 1 0 0 0,1-1 0 0 0,-1 1 0 0 0,1-1 0 0 0,-1 1 0 0 0,1 0 0 0 0,-1-1 0 0 0,1 1 0 0 0,-1-1 0 0 0,1 1 0 0 0,-1 0 0 0 0,1-1 0 0 0,0 1 0 0 0,-1 0 0 0 0,1 0 0 0 0,0 0 0 0 0,-1 0 0 0 0,1-1 0 0 0,0 1-1 0 0,-1 0 1 0 0,1 0 0 0 0,0 0 0 0 0,-1 0 0 0 0,1 0 0 0 0,0 0 0 0 0,-1 1 0 0 0,1-1 0 0 0,-1 0 0 0 0,1 0 0 0 0,0 0 0 0 0,-1 1 0 0 0,1-1 0 0 0,0 0 0 0 0,-1 1 0 0 0,1-1 0 0 0,-1 0 0 0 0,1 1 0 0 0,-1-1 0 0 0,1 1 0 0 0,-1-1 0 0 0,1 1 0 0 0,-1-1 0 0 0,0 1 0 0 0,1-1 0 0 0,-1 1 0 0 0,1-1 0 0 0,-1 1-1 0 0,0 0 1 0 0,0-1 0 0 0,1 1 0 0 0,-1 0 0 0 0,0-1 0 0 0,0 1 0 0 0,0 0 0 0 0,0 0 0 0 0,2 5 153 0 0,-1-1 0 0 0,0 1-1 0 0,-1-1 1 0 0,1 1-1 0 0,-1 8 1 0 0,-3 17-171 0 0,-2-1 0 0 0,-12 43 0 0 0,15-63 0 0 0,0-5-2 0 0,1 1-24 0 0,0-1-1 0 0,0 0 1 0 0,0 1 0 0 0,1-1-1 0 0,0 8 1 0 0,11-16-382 0 0,-3-2 479 0 0,0-1 0 0 0,-1 0 0 0 0,1-1 0 0 0,-1 1 0 0 0,-1-1 0 0 0,12-15 0 0 0,14-18 100 0 0,1 1 0 0 0,43-37-1 0 0,-74 74-77 0 0,0 0-1 0 0,0 0 0 0 0,1 0 0 0 0,-1 1 0 0 0,1-1 0 0 0,-1 1 0 0 0,1 0 0 0 0,0-1 0 0 0,-1 1 0 0 0,1 0 0 0 0,0 0 1 0 0,0 1-1 0 0,0-1 0 0 0,0 1 0 0 0,4-1 0 0 0,-5 1-87 0 0,0 1 0 0 0,-1-1 0 0 0,1 1 0 0 0,0-1 1 0 0,0 1-1 0 0,-1 0 0 0 0,1-1 0 0 0,0 1 0 0 0,-1 0 0 0 0,1 0 0 0 0,-1 0 0 0 0,1 1 1 0 0,-1-1-1 0 0,0 0 0 0 0,1 0 0 0 0,-1 1 0 0 0,0-1 0 0 0,0 1 0 0 0,0-1 0 0 0,0 1 0 0 0,0 0 1 0 0,0-1-1 0 0,-1 1 0 0 0,1 0 0 0 0,1 3 0 0 0,5 22-134 0 0,-6-18-219 0 0,2 0 1 0 0,4 12-1 0 0,-7-20 194 0 0,1 1-1 0 0,0 0 1 0 0,0-1 0 0 0,0 1 0 0 0,0 0 0 0 0,0-1 0 0 0,0 1 0 0 0,0-1 0 0 0,1 0 0 0 0,-1 1-1 0 0,0-1 1 0 0,1 0 0 0 0,-1 0 0 0 0,1 0 0 0 0,-1 0 0 0 0,1 0 0 0 0,2 1 0 0 0,-3-2-417 0 0,0 1 0 0 0,0-1 0 0 0,0 0 0 0 0,0 0 0 0 0,0 0 1 0 0,0 0-1 0 0,1 0 0 0 0,-1 0 0 0 0,0 0 0 0 0,0 0 0 0 0,0 0 0 0 0,0-1 1 0 0,2 1-1 0 0,10-7-7082 0 0</inkml:trace>
+</inkml:ink>
+</file>
+
+<file path=ppt/ink/ink12.xml><?xml version="1.0" encoding="utf-8"?>
+<inkml:ink xmlns:inkml="http://www.w3.org/2003/InkML">
+  <inkml:definitions>
+    <inkml:context xml:id="ctx0">
+      <inkml:inkSource xml:id="inkSrc0">
+        <inkml:traceFormat>
+          <inkml:channel name="X" type="integer" min="-2.14748E9" max="2.14748E9" units="cm"/>
+          <inkml:channel name="Y" type="integer" min="-2.14748E9" max="2.14748E9" units="cm"/>
+          <inkml:channel name="F" type="integer" max="32767" units="dev"/>
+          <inkml:channel name="OA" type="integer" max="360" units="deg"/>
+          <inkml:channel name="OE" type="integer" max="90" units="deg"/>
+        </inkml:traceFormat>
+        <inkml:channelProperties>
+          <inkml:channelProperty channel="X" name="resolution" value="1000" units="1/cm"/>
+          <inkml:channelProperty channel="Y" name="resolution" value="1000" units="1/cm"/>
+          <inkml:channelProperty channel="F" name="resolution" value="0" units="1/dev"/>
+          <inkml:channelProperty channel="OA" name="resolution" value="1000" units="1/deg"/>
+          <inkml:channelProperty channel="OE" name="resolution" value="1000" units="1/deg"/>
+        </inkml:channelProperties>
+      </inkml:inkSource>
+      <inkml:timestamp xml:id="ts0" timeString="2021-01-06T19:01:20.424"/>
+    </inkml:context>
+    <inkml:brush xml:id="br0">
+      <inkml:brushProperty name="width" value="0.05" units="cm"/>
+      <inkml:brushProperty name="height" value="0.05" units="cm"/>
+      <inkml:brushProperty name="color" value="#E71224"/>
+    </inkml:brush>
+  </inkml:definitions>
+  <inkml:trace contextRef="#ctx0" brushRef="#br0">161 245 19351 0 0,'-3'3'424'0'0,"-2"3"88"0"0,0 3 24 0 0,-2 3 8 0 0,-1 4-440 0 0,0 4-104 0 0,-4 3 0 0 0,1 4 0 0 0,-1-2 352 0 0,-4 2 40 0 0,2 3 16 0 0,0-2 0 0 0,0-3-408 0 0,3 0 0 0 0,2-5 0 0 0,3-2-6152 0 0,1-6-1215 0 0</inkml:trace>
+  <inkml:trace contextRef="#ctx0" brushRef="#br0" timeOffset="1">288 1 15664 0 0,'0'0'344'0'0,"-3"9"71"0"0,0-2 9 0 0,3 9 24 0 0,-5-1-360 0 0,2 7-88 0 0,0-2 0 0 0,-3 5-6943 0 0</inkml:trace>
+</inkml:ink>
+</file>
+
+<file path=ppt/ink/ink13.xml><?xml version="1.0" encoding="utf-8"?>
+<inkml:ink xmlns:inkml="http://www.w3.org/2003/InkML">
+  <inkml:definitions>
+    <inkml:context xml:id="ctx0">
+      <inkml:inkSource xml:id="inkSrc0">
+        <inkml:traceFormat>
+          <inkml:channel name="X" type="integer" min="-2.14748E9" max="2.14748E9" units="cm"/>
+          <inkml:channel name="Y" type="integer" min="-2.14748E9" max="2.14748E9" units="cm"/>
+          <inkml:channel name="F" type="integer" max="32767" units="dev"/>
+          <inkml:channel name="OA" type="integer" max="360" units="deg"/>
+          <inkml:channel name="OE" type="integer" max="90" units="deg"/>
+        </inkml:traceFormat>
+        <inkml:channelProperties>
+          <inkml:channelProperty channel="X" name="resolution" value="1000" units="1/cm"/>
+          <inkml:channelProperty channel="Y" name="resolution" value="1000" units="1/cm"/>
+          <inkml:channelProperty channel="F" name="resolution" value="0" units="1/dev"/>
+          <inkml:channelProperty channel="OA" name="resolution" value="1000" units="1/deg"/>
+          <inkml:channelProperty channel="OE" name="resolution" value="1000" units="1/deg"/>
+        </inkml:channelProperties>
+      </inkml:inkSource>
+      <inkml:timestamp xml:id="ts0" timeString="2021-01-06T19:01:20.794"/>
+    </inkml:context>
+    <inkml:brush xml:id="br0">
+      <inkml:brushProperty name="width" value="0.05" units="cm"/>
+      <inkml:brushProperty name="height" value="0.05" units="cm"/>
+      <inkml:brushProperty name="color" value="#E71224"/>
+    </inkml:brush>
+  </inkml:definitions>
+  <inkml:trace contextRef="#ctx0" brushRef="#br0">1 129 7832 0 0,'1'1'63'0'0,"0"0"0"0"0,0 0-1 0 0,1 0 1 0 0,-1 0 0 0 0,0 0 0 0 0,1-1 0 0 0,-1 1 0 0 0,1-1 0 0 0,-1 1 0 0 0,1-1-1 0 0,-1 1 1 0 0,1-1 0 0 0,-1 0 0 0 0,1 0 0 0 0,-1 0 0 0 0,1 0 0 0 0,0 0 0 0 0,2 0-1 0 0,-3-1 461 0 0,0 0-1 0 0,1 1 0 0 0,-1-1 1 0 0,0 0-1 0 0,0 0 0 0 0,0 0 1 0 0,0 0-1 0 0,0 0 0 0 0,0 0 1 0 0,0 0-1 0 0,0-1 0 0 0,0 1 0 0 0,0 0 1 0 0,0 0-1 0 0,-1-1 0 0 0,1 1 1 0 0,0-3-1 0 0,4-26 3425 0 0,-2 7-2436 0 0,0 12-834 0 0,0 1 0 0 0,7-12 0 0 0,-2 2 849 0 0,7 37-1093 0 0,-13-13-323 0 0,0 0-1 0 0,0 1 0 0 0,0-1 0 0 0,-1 0 1 0 0,0 1-1 0 0,1-1 0 0 0,-1 1 0 0 0,-1-1 1 0 0,1 1-1 0 0,-1-1 0 0 0,0 7 0 0 0,0-7-77 0 0,0 0 1 0 0,0 1-1 0 0,0-1 0 0 0,1 0 1 0 0,0 0-1 0 0,0 1 0 0 0,0-1 0 0 0,0 0 1 0 0,0 0-1 0 0,1 0 0 0 0,0 0 1 0 0,0 0-1 0 0,4 5 0 0 0,-4-6-234 0 0,0-1-1 0 0,0 0 1 0 0,1 1 0 0 0,-1-1-1 0 0,0 0 1 0 0,1-1 0 0 0,0 1-1 0 0,-1 0 1 0 0,1-1-1 0 0,4 2 1 0 0,17 2-7846 0 0,-10-4-301 0 0</inkml:trace>
+</inkml:ink>
+</file>
+
+<file path=ppt/ink/ink14.xml><?xml version="1.0" encoding="utf-8"?>
+<inkml:ink xmlns:inkml="http://www.w3.org/2003/InkML">
+  <inkml:definitions>
+    <inkml:context xml:id="ctx0">
+      <inkml:inkSource xml:id="inkSrc0">
+        <inkml:traceFormat>
+          <inkml:channel name="X" type="integer" min="-2.14748E9" max="2.14748E9" units="cm"/>
+          <inkml:channel name="Y" type="integer" min="-2.14748E9" max="2.14748E9" units="cm"/>
+          <inkml:channel name="F" type="integer" max="32767" units="dev"/>
+          <inkml:channel name="OA" type="integer" max="360" units="deg"/>
+          <inkml:channel name="OE" type="integer" max="90" units="deg"/>
+        </inkml:traceFormat>
+        <inkml:channelProperties>
+          <inkml:channelProperty channel="X" name="resolution" value="1000" units="1/cm"/>
+          <inkml:channelProperty channel="Y" name="resolution" value="1000" units="1/cm"/>
+          <inkml:channelProperty channel="F" name="resolution" value="0" units="1/dev"/>
+          <inkml:channelProperty channel="OA" name="resolution" value="1000" units="1/deg"/>
+          <inkml:channelProperty channel="OE" name="resolution" value="1000" units="1/deg"/>
+        </inkml:channelProperties>
+      </inkml:inkSource>
+      <inkml:timestamp xml:id="ts0" timeString="2021-01-06T19:01:21.160"/>
+    </inkml:context>
+    <inkml:brush xml:id="br0">
+      <inkml:brushProperty name="width" value="0.05" units="cm"/>
+      <inkml:brushProperty name="height" value="0.05" units="cm"/>
+      <inkml:brushProperty name="color" value="#E71224"/>
+    </inkml:brush>
+  </inkml:definitions>
+  <inkml:trace contextRef="#ctx0" brushRef="#br0">28 45 16128 0 0,'-16'-7'711'0'0,"6"7"153"0"0,8-5-696 0 0,7-1 1128 0 0,12-1 224 0 0,3 5 48 0 0,6-3 0 0 0,-4 0-1384 0 0,6-1-280 0 0,6 4-64 0 0,3 2 0 0 0,-3 2-1152 0 0,2-2-224 0 0</inkml:trace>
+</inkml:ink>
+</file>
+
+<file path=ppt/ink/ink15.xml><?xml version="1.0" encoding="utf-8"?>
+<inkml:ink xmlns:inkml="http://www.w3.org/2003/InkML">
+  <inkml:definitions>
+    <inkml:context xml:id="ctx0">
+      <inkml:inkSource xml:id="inkSrc0">
+        <inkml:traceFormat>
+          <inkml:channel name="X" type="integer" min="-2.14748E9" max="2.14748E9" units="cm"/>
+          <inkml:channel name="Y" type="integer" min="-2.14748E9" max="2.14748E9" units="cm"/>
+          <inkml:channel name="F" type="integer" max="32767" units="dev"/>
+          <inkml:channel name="OA" type="integer" max="360" units="deg"/>
+          <inkml:channel name="OE" type="integer" max="90" units="deg"/>
+        </inkml:traceFormat>
+        <inkml:channelProperties>
+          <inkml:channelProperty channel="X" name="resolution" value="1000" units="1/cm"/>
+          <inkml:channelProperty channel="Y" name="resolution" value="1000" units="1/cm"/>
+          <inkml:channelProperty channel="F" name="resolution" value="0" units="1/dev"/>
+          <inkml:channelProperty channel="OA" name="resolution" value="1000" units="1/deg"/>
+          <inkml:channelProperty channel="OE" name="resolution" value="1000" units="1/deg"/>
+        </inkml:channelProperties>
+      </inkml:inkSource>
+      <inkml:timestamp xml:id="ts0" timeString="2021-01-06T19:01:21.514"/>
+    </inkml:context>
+    <inkml:brush xml:id="br0">
+      <inkml:brushProperty name="width" value="0.05" units="cm"/>
+      <inkml:brushProperty name="height" value="0.05" units="cm"/>
+      <inkml:brushProperty name="color" value="#E71224"/>
+    </inkml:brush>
+  </inkml:definitions>
+  <inkml:trace contextRef="#ctx0" brushRef="#br0">8 1 15344 0 0,'0'0'1393'0'0,"-7"5"1659"0"0,12-3-2736 0 0,1-1 1 0 0,0 0 0 0 0,-1 0-1 0 0,11 1 1 0 0,10 1 205 0 0,-15-2-375 0 0,-1 1 0 0 0,1 1 0 0 0,-1 0 0 0 0,0 1 0 0 0,0 0 0 0 0,17 9 0 0 0,-24-11-140 0 0,0 0 0 0 0,0 1 0 0 0,0-1 0 0 0,0 1 1 0 0,0-1-1 0 0,0 1 0 0 0,-1 0 0 0 0,1 0 0 0 0,-1 1 0 0 0,0-1 0 0 0,0 0 0 0 0,0 1 0 0 0,-1-1 0 0 0,1 1 0 0 0,-1 0 0 0 0,0-1 0 0 0,0 1 1 0 0,0 0-1 0 0,0 0 0 0 0,-1 0 0 0 0,0 0 0 0 0,1 5 0 0 0,-1 2 16 0 0,-1 0 0 0 0,0-1 1 0 0,0 1-1 0 0,-1 0 0 0 0,0-1 0 0 0,-1 1 1 0 0,-1-1-1 0 0,1 0 0 0 0,-1 0 0 0 0,-1 0 0 0 0,-9 14 1 0 0,-2 1-14 0 0,16-24-10 0 0,0-1 0 0 0,0 0 0 0 0,0 1 0 0 0,1-1 0 0 0,-1 0 0 0 0,0 1 0 0 0,0-1 0 0 0,1 0 0 0 0,-1 0 0 0 0,0 1 0 0 0,0-1 0 0 0,1 0 0 0 0,-1 0 0 0 0,0 1 0 0 0,1-1 0 0 0,-1 0 0 0 0,0 0 0 0 0,1 0 0 0 0,-1 0 0 0 0,0 1 0 0 0,1-1 0 0 0,-1 0 0 0 0,0 0 0 0 0,1 0 0 0 0,-1 0 0 0 0,1 0 0 0 0,-1 0 0 0 0,36 6 370 0 0,-25-4-66 0 0,-1-1 1 0 0,1 1 0 0 0,-1 1 0 0 0,14 5 0 0 0,-22-7-258 0 0,1 0-1 0 0,-1 0 1 0 0,1 1-1 0 0,-1-1 1 0 0,0 1 0 0 0,0 0-1 0 0,1-1 1 0 0,-1 1-1 0 0,0 0 1 0 0,-1 0 0 0 0,1 0-1 0 0,0 0 1 0 0,-1 1-1 0 0,1-1 1 0 0,-1 0-1 0 0,0 1 1 0 0,1-1 0 0 0,-1 1-1 0 0,0 0 1 0 0,-1-1-1 0 0,2 6 1 0 0,-1 0 14 0 0,-1-1 0 0 0,0 1 1 0 0,0 0-1 0 0,-1 0 0 0 0,0-1 0 0 0,0 1 1 0 0,-1 0-1 0 0,0-1 0 0 0,0 1 0 0 0,0-1 1 0 0,-1 0-1 0 0,-6 11 0 0 0,-1 0 21 0 0,-1 0 0 0 0,0-1 0 0 0,-22 24 0 0 0,21-28-326 0 0,0-2 0 0 0,0 1 0 0 0,-2-2 0 0 0,1 0 0 0 0,-1 0 0 0 0,-30 15 0 0 0,73-52-10802 0 0,-8 15 4694 0 0</inkml:trace>
+</inkml:ink>
+</file>
+
+<file path=ppt/ink/ink16.xml><?xml version="1.0" encoding="utf-8"?>
+<inkml:ink xmlns:inkml="http://www.w3.org/2003/InkML">
+  <inkml:definitions>
+    <inkml:context xml:id="ctx0">
+      <inkml:inkSource xml:id="inkSrc0">
+        <inkml:traceFormat>
+          <inkml:channel name="X" type="integer" min="-2.14748E9" max="2.14748E9" units="cm"/>
+          <inkml:channel name="Y" type="integer" min="-2.14748E9" max="2.14748E9" units="cm"/>
+          <inkml:channel name="F" type="integer" max="32767" units="dev"/>
+          <inkml:channel name="OA" type="integer" max="360" units="deg"/>
+          <inkml:channel name="OE" type="integer" max="90" units="deg"/>
+        </inkml:traceFormat>
+        <inkml:channelProperties>
+          <inkml:channelProperty channel="X" name="resolution" value="1000" units="1/cm"/>
+          <inkml:channelProperty channel="Y" name="resolution" value="1000" units="1/cm"/>
+          <inkml:channelProperty channel="F" name="resolution" value="0" units="1/dev"/>
+          <inkml:channelProperty channel="OA" name="resolution" value="1000" units="1/deg"/>
+          <inkml:channelProperty channel="OE" name="resolution" value="1000" units="1/deg"/>
+        </inkml:channelProperties>
+      </inkml:inkSource>
+      <inkml:timestamp xml:id="ts0" timeString="2021-01-06T19:01:21.861"/>
+    </inkml:context>
+    <inkml:brush xml:id="br0">
+      <inkml:brushProperty name="width" value="0.05" units="cm"/>
+      <inkml:brushProperty name="height" value="0.05" units="cm"/>
+      <inkml:brushProperty name="color" value="#E71224"/>
+    </inkml:brush>
+  </inkml:definitions>
+  <inkml:trace contextRef="#ctx0" brushRef="#br0">262 113 5984 0 0,'4'-8'74'0'0,"1"-1"1"0"0,-1 1-1 0 0,4-15 1 0 0,-7 20 130 0 0,-1 1 1 0 0,1-1 0 0 0,0 0 0 0 0,-1 0-1 0 0,1 0 1 0 0,-1 0 0 0 0,0 0-1 0 0,0 0 1 0 0,0 0 0 0 0,-1 0-1 0 0,1 0 1 0 0,-1 0 0 0 0,1 0 0 0 0,-1 0-1 0 0,-2-4 1 0 0,3 6 214 0 0,-1 0 0 0 0,0 0 0 0 0,1 0 0 0 0,-1 0 0 0 0,0 0-1 0 0,1 1 1 0 0,-1-1 0 0 0,0 0 0 0 0,0 1 0 0 0,0-1 0 0 0,0 0 0 0 0,0 1 0 0 0,0-1 0 0 0,0 1 0 0 0,0-1 0 0 0,0 1-1 0 0,0 0 1 0 0,-1-1 0 0 0,0 1-54 0 0,0-1-1 0 0,0 1 0 0 0,-1 0 0 0 0,1 0 1 0 0,0 1-1 0 0,0-1 0 0 0,0 0 1 0 0,-4 2-1 0 0,0 0-148 0 0,0 0-1 0 0,1 0 1 0 0,-1 1 0 0 0,1 0 0 0 0,-8 5-1 0 0,-5 7 86 0 0,1 0-1 0 0,1 0 0 0 0,0 2 0 0 0,1 0 1 0 0,1 0-1 0 0,1 2 0 0 0,0 0 0 0 0,1 0 0 0 0,1 1 1 0 0,1 0-1 0 0,1 1 0 0 0,1 0 0 0 0,1 1 1 0 0,1 0-1 0 0,-6 33 0 0 0,11-47-99 0 0,0 0 0 0 0,1 0-1 0 0,0 0 1 0 0,0-1 0 0 0,2 15-1 0 0,-2-20-154 0 0,1-1 0 0 0,-1 1 0 0 0,1-1 1 0 0,-1 1-1 0 0,1 0 0 0 0,0-1 0 0 0,-1 1 0 0 0,1-1 0 0 0,0 0 0 0 0,0 1 0 0 0,0-1 0 0 0,0 0 0 0 0,0 1 0 0 0,2 0 1 0 0,-2-1-21 0 0,1 0 1 0 0,-1-1-1 0 0,0 1 1 0 0,0-1 0 0 0,0 1-1 0 0,1-1 1 0 0,-1 0-1 0 0,0 0 1 0 0,1 0 0 0 0,-1 1-1 0 0,0-1 1 0 0,0 0 0 0 0,1-1-1 0 0,-1 1 1 0 0,0 0-1 0 0,1 0 1 0 0,-1 0 0 0 0,0-1-1 0 0,0 1 1 0 0,1-1 0 0 0,1 0-1 0 0,4-2 35 0 0,-1-1-1 0 0,1 0 0 0 0,-1 0 1 0 0,1 0-1 0 0,-1-1 1 0 0,0 0-1 0 0,-1 0 1 0 0,10-11-1 0 0,3-7 84 0 0,15-25 0 0 0,-24 33-80 0 0,7-10 27 0 0,-1-1 1 0 0,12-32-1 0 0,18-60-1690 0 0,-42 112 1336 0 0,7-22-747 0 0</inkml:trace>
+</inkml:ink>
+</file>
+
+<file path=ppt/ink/ink17.xml><?xml version="1.0" encoding="utf-8"?>
+<inkml:ink xmlns:inkml="http://www.w3.org/2003/InkML">
+  <inkml:definitions>
+    <inkml:context xml:id="ctx0">
+      <inkml:inkSource xml:id="inkSrc0">
+        <inkml:traceFormat>
+          <inkml:channel name="X" type="integer" min="-2.14748E9" max="2.14748E9" units="cm"/>
+          <inkml:channel name="Y" type="integer" min="-2.14748E9" max="2.14748E9" units="cm"/>
+          <inkml:channel name="F" type="integer" max="32767" units="dev"/>
+          <inkml:channel name="OA" type="integer" max="360" units="deg"/>
+          <inkml:channel name="OE" type="integer" max="90" units="deg"/>
+        </inkml:traceFormat>
+        <inkml:channelProperties>
+          <inkml:channelProperty channel="X" name="resolution" value="1000" units="1/cm"/>
+          <inkml:channelProperty channel="Y" name="resolution" value="1000" units="1/cm"/>
+          <inkml:channelProperty channel="F" name="resolution" value="0" units="1/dev"/>
+          <inkml:channelProperty channel="OA" name="resolution" value="1000" units="1/deg"/>
+          <inkml:channelProperty channel="OE" name="resolution" value="1000" units="1/deg"/>
+        </inkml:channelProperties>
+      </inkml:inkSource>
+      <inkml:timestamp xml:id="ts0" timeString="2021-01-06T19:01:22.329"/>
+    </inkml:context>
+    <inkml:brush xml:id="br0">
+      <inkml:brushProperty name="width" value="0.05" units="cm"/>
+      <inkml:brushProperty name="height" value="0.05" units="cm"/>
+      <inkml:brushProperty name="color" value="#E71224"/>
+    </inkml:brush>
+  </inkml:definitions>
+  <inkml:trace contextRef="#ctx0" brushRef="#br0">0 202 15664 0 0,'0'0'718'0'0,"12"-10"259"0"0,12-30 937 0 0,-5 13-640 0 0,-10 13-772 0 0,1 1 0 0 0,0 0 0 0 0,1 0 0 0 0,0 1 0 0 0,16-13 0 0 0,-26 23-482 0 0,-1 2-18 0 0,0-1 1 0 0,1 1-1 0 0,-1 0 0 0 0,1-1 1 0 0,-1 1-1 0 0,1-1 0 0 0,-1 1 1 0 0,1 0-1 0 0,-1-1 0 0 0,1 1 1 0 0,-1 0-1 0 0,1-1 0 0 0,-1 1 1 0 0,1 0-1 0 0,0 0 0 0 0,-1 0 1 0 0,1 0-1 0 0,-1-1 1 0 0,1 1-1 0 0,0 0 0 0 0,-1 0 1 0 0,1 0-1 0 0,-1 0 0 0 0,1 0 1 0 0,0 0-1 0 0,-1 1 0 0 0,2-1 1 0 0,4 3 7 0 0,-4-1-13 0 0,0 1 0 0 0,0 0 0 0 0,0 0 0 0 0,0 1 0 0 0,-1-1 0 0 0,1 0 0 0 0,-1 0 0 0 0,0 1 0 0 0,0-1 0 0 0,0 1 0 0 0,0 5 0 0 0,1 4-15 0 0,0 24 0 0 0,0 46-126 0 0,-1-74 144 0 0,5-4 0 0 0,-5-5 2 0 0,1 0-1 0 0,-1 0 0 0 0,0 0 0 0 0,1 0 1 0 0,-1 0-1 0 0,1 0 0 0 0,-1 0 1 0 0,0 0-1 0 0,1-1 0 0 0,-1 1 1 0 0,0-1-1 0 0,0 1 0 0 0,1-1 1 0 0,-1 1-1 0 0,0-1 0 0 0,0 0 0 0 0,0 1 1 0 0,2-3-1 0 0,21-18 131 0 0,-23 20-121 0 0,55-57 799 0 0,-17 16 648 0 0,47-38 1 0 0,-84 79-1405 0 0,0-1 0 0 0,0 1 1 0 0,0 0-1 0 0,0 0 0 0 0,0-1 0 0 0,0 1 1 0 0,0 1-1 0 0,0-1 0 0 0,3 0 0 0 0,-5 0-49 0 0,1 1-1 0 0,-1 0 1 0 0,0 0-1 0 0,1 0 1 0 0,-1 0-1 0 0,0 0 1 0 0,1 0-1 0 0,-1 0 1 0 0,1 0-1 0 0,-1 1 1 0 0,0-1 0 0 0,1 0-1 0 0,-1 0 1 0 0,0 0-1 0 0,1 0 1 0 0,-1 0-1 0 0,0 1 1 0 0,1-1-1 0 0,-1 0 1 0 0,0 0-1 0 0,1 0 1 0 0,-1 1-1 0 0,0 0-4 0 0,1-1 1 0 0,-1 1-1 0 0,0-1 0 0 0,0 1 0 0 0,1 0 1 0 0,-1-1-1 0 0,0 1 0 0 0,0 0 0 0 0,0-1 1 0 0,0 1-1 0 0,0 0 0 0 0,0-1 0 0 0,0 1 1 0 0,0 0-1 0 0,0-1 0 0 0,0 1 0 0 0,0 0 0 0 0,-2 15-1267 0 0,0 32 0 0 0</inkml:trace>
+</inkml:ink>
+</file>
+
+<file path=ppt/ink/ink18.xml><?xml version="1.0" encoding="utf-8"?>
+<inkml:ink xmlns:inkml="http://www.w3.org/2003/InkML">
+  <inkml:definitions>
+    <inkml:context xml:id="ctx0">
+      <inkml:inkSource xml:id="inkSrc0">
+        <inkml:traceFormat>
+          <inkml:channel name="X" type="integer" min="-2.14748E9" max="2.14748E9" units="cm"/>
+          <inkml:channel name="Y" type="integer" min="-2.14748E9" max="2.14748E9" units="cm"/>
+          <inkml:channel name="F" type="integer" max="32767" units="dev"/>
+          <inkml:channel name="OA" type="integer" max="360" units="deg"/>
+          <inkml:channel name="OE" type="integer" max="90" units="deg"/>
+        </inkml:traceFormat>
+        <inkml:channelProperties>
+          <inkml:channelProperty channel="X" name="resolution" value="1000" units="1/cm"/>
+          <inkml:channelProperty channel="Y" name="resolution" value="1000" units="1/cm"/>
+          <inkml:channelProperty channel="F" name="resolution" value="0" units="1/dev"/>
+          <inkml:channelProperty channel="OA" name="resolution" value="1000" units="1/deg"/>
+          <inkml:channelProperty channel="OE" name="resolution" value="1000" units="1/deg"/>
+        </inkml:channelProperties>
+      </inkml:inkSource>
+      <inkml:timestamp xml:id="ts0" timeString="2021-01-06T19:01:22.673"/>
+    </inkml:context>
+    <inkml:brush xml:id="br0">
+      <inkml:brushProperty name="width" value="0.05" units="cm"/>
+      <inkml:brushProperty name="height" value="0.05" units="cm"/>
+      <inkml:brushProperty name="color" value="#E71224"/>
+    </inkml:brush>
+  </inkml:definitions>
+  <inkml:trace contextRef="#ctx0" brushRef="#br0">17 402 5528 0 0,'0'0'600'0'0,"6"7"-600"0"0,-4-2 0 0 0,1 8 0 0 0,-3 1 2432 0 0,0 4 480 0 0,0 0 96 0 0,0 4 23 0 0,-5 0-2079 0 0,2 3-416 0 0,0 1-88 0 0,-2-1-8 0 0,-1-3-312 0 0,3-4-56 0 0,0 2-8 0 0,3-8-8127 0 0</inkml:trace>
+  <inkml:trace contextRef="#ctx0" brushRef="#br0" timeOffset="1">225 1 16439 0 0,'-13'3'360'0'0,"7"-1"80"0"0,0 0 8 0 0,3 3 16 0 0,-2 6-368 0 0,0-2-96 0 0,-2 4 0 0 0,4 2 0 0 0,-2 5-976 0 0,0 0-207 0 0,-1 5-49 0 0</inkml:trace>
+</inkml:ink>
+</file>
+
+<file path=ppt/ink/ink19.xml><?xml version="1.0" encoding="utf-8"?>
+<inkml:ink xmlns:inkml="http://www.w3.org/2003/InkML">
+  <inkml:definitions>
+    <inkml:context xml:id="ctx0">
+      <inkml:inkSource xml:id="inkSrc0">
+        <inkml:traceFormat>
+          <inkml:channel name="X" type="integer" min="-2.14748E9" max="2.14748E9" units="cm"/>
+          <inkml:channel name="Y" type="integer" min="-2.14748E9" max="2.14748E9" units="cm"/>
+          <inkml:channel name="F" type="integer" max="32767" units="dev"/>
+          <inkml:channel name="OA" type="integer" max="360" units="deg"/>
+          <inkml:channel name="OE" type="integer" max="90" units="deg"/>
+        </inkml:traceFormat>
+        <inkml:channelProperties>
+          <inkml:channelProperty channel="X" name="resolution" value="1000" units="1/cm"/>
+          <inkml:channelProperty channel="Y" name="resolution" value="1000" units="1/cm"/>
+          <inkml:channelProperty channel="F" name="resolution" value="0" units="1/dev"/>
+          <inkml:channelProperty channel="OA" name="resolution" value="1000" units="1/deg"/>
+          <inkml:channelProperty channel="OE" name="resolution" value="1000" units="1/deg"/>
+        </inkml:channelProperties>
+      </inkml:inkSource>
+      <inkml:timestamp xml:id="ts0" timeString="2021-01-06T19:01:23.024"/>
+    </inkml:context>
+    <inkml:brush xml:id="br0">
+      <inkml:brushProperty name="width" value="0.05" units="cm"/>
+      <inkml:brushProperty name="height" value="0.05" units="cm"/>
+      <inkml:brushProperty name="color" value="#E71224"/>
+    </inkml:brush>
+  </inkml:definitions>
+  <inkml:trace contextRef="#ctx0" brushRef="#br0">0 278 3224 0 0,'3'-1'8517'0'0,"9"-6"-3652"0"0,-9 3-4283 0 0,0-1 0 0 0,0 1 1 0 0,0-1-1 0 0,0 0 0 0 0,-1 0 0 0 0,1 0 0 0 0,-1 0 0 0 0,0 0 0 0 0,-1 0 0 0 0,0-1 1 0 0,1 1-1 0 0,-1-7 0 0 0,10-29 1727 0 0,-10 39-2249 0 0,0-3 74 0 0,1 1 0 0 0,0 0 0 0 0,0-1 0 0 0,0 1 0 0 0,1 0 0 0 0,-1 0 0 0 0,7-7 0 0 0,-5 7-134 0 0,1 4 0 0 0,14 11 11 0 0,-17-10-6 0 0,-1 0-1 0 0,0 0 1 0 0,1 0-1 0 0,0 0 1 0 0,-1 0-1 0 0,1 0 1 0 0,0 0 0 0 0,-1 0-1 0 0,1-1 1 0 0,0 1-1 0 0,0 0 1 0 0,-1-1-1 0 0,1 0 1 0 0,0 1-1 0 0,0-1 1 0 0,0 0 0 0 0,0 0-1 0 0,0 0 1 0 0,0 0-1 0 0,-1-1 1 0 0,1 1-1 0 0,0 0 1 0 0,0-1-1 0 0,0 1 1 0 0,2-2-1 0 0,3-2 37 0 0,-1 0-1 0 0,0-1 1 0 0,0 1-1 0 0,-1-1 0 0 0,1-1 1 0 0,-1 1-1 0 0,6-9 0 0 0,10-16-2010 0 0,-3 0-4828 0 0,-18 30 6741 0 0,13-23-8233 0 0</inkml:trace>
+</inkml:ink>
+</file>
+
+<file path=ppt/ink/ink2.xml><?xml version="1.0" encoding="utf-8"?>
+<inkml:ink xmlns:inkml="http://www.w3.org/2003/InkML">
+  <inkml:definitions>
+    <inkml:context xml:id="ctx0">
+      <inkml:inkSource xml:id="inkSrc0">
+        <inkml:traceFormat>
+          <inkml:channel name="X" type="integer" min="-2.14748E9" max="2.14748E9" units="cm"/>
+          <inkml:channel name="Y" type="integer" min="-2.14748E9" max="2.14748E9" units="cm"/>
+          <inkml:channel name="F" type="integer" max="32767" units="dev"/>
+          <inkml:channel name="OA" type="integer" max="360" units="deg"/>
+          <inkml:channel name="OE" type="integer" max="90" units="deg"/>
+        </inkml:traceFormat>
+        <inkml:channelProperties>
+          <inkml:channelProperty channel="X" name="resolution" value="1000" units="1/cm"/>
+          <inkml:channelProperty channel="Y" name="resolution" value="1000" units="1/cm"/>
+          <inkml:channelProperty channel="F" name="resolution" value="0" units="1/dev"/>
+          <inkml:channelProperty channel="OA" name="resolution" value="1000" units="1/deg"/>
+          <inkml:channelProperty channel="OE" name="resolution" value="1000" units="1/deg"/>
+        </inkml:channelProperties>
+      </inkml:inkSource>
+      <inkml:timestamp xml:id="ts0" timeString="2021-01-06T19:00:34.444"/>
+    </inkml:context>
+    <inkml:brush xml:id="br0">
+      <inkml:brushProperty name="width" value="0.05" units="cm"/>
+      <inkml:brushProperty name="height" value="0.05" units="cm"/>
+      <inkml:brushProperty name="color" value="#E71224"/>
+    </inkml:brush>
+  </inkml:definitions>
+  <inkml:trace contextRef="#ctx0" brushRef="#br0">123 186 7832 0 0,'-12'1'524'0'0,"0"0"0"0"0,0 1 0 0 0,0 0 1 0 0,-18 7-1 0 0,-5 0 3468 0 0,34-9-3881 0 0,1 1 0 0 0,0-1 1 0 0,-1 0-1 0 0,1 0 0 0 0,0 0 1 0 0,-1 0-1 0 0,1 0 0 0 0,-1 0 1 0 0,1 0-1 0 0,0 0 0 0 0,-1 0 0 0 0,1 0 1 0 0,0 0-1 0 0,-1 0 0 0 0,1 0 1 0 0,0 0-1 0 0,-1 0 0 0 0,1 0 0 0 0,-1 0 1 0 0,1 0-1 0 0,0 0 0 0 0,-1-1 1 0 0,1 1-1 0 0,3-6 1070 0 0,-1 4-1092 0 0,0 0-1 0 0,0 1 0 0 0,0-1 1 0 0,0 1-1 0 0,0-1 0 0 0,4-1 0 0 0,8-1 184 0 0,0 1-1 0 0,0 0 1 0 0,24-1-1 0 0,46 2 336 0 0,-62 2-456 0 0,110 5 704 0 0,-74-1-502 0 0,98 8 472 0 0,-12 0-92 0 0,-25-5 72 0 0,203-15 0 0 0,-84-25 194 0 0,-93 11-342 0 0,-97 15-418 0 0,186-18 438 0 0,-94 20-313 0 0,-136 5-341 0 0,-1-1 0 0 0,1 1 0 0 0,-1-1-1 0 0,0 0 1 0 0,1 0 0 0 0,-1 0 0 0 0,0-1 0 0 0,0 1 0 0 0,0-1-1 0 0,0 1 1 0 0,0-1 0 0 0,0 0 0 0 0,0 0 0 0 0,-1-1-1 0 0,1 1 1 0 0,2-3 0 0 0,5-6-113 0 0,-1 0 0 0 0,11-18 0 0 0,-18 25-21 0 0,18-23-3858 0 0,-16 22 2715 0 0</inkml:trace>
+</inkml:ink>
+</file>
+
+<file path=ppt/ink/ink3.xml><?xml version="1.0" encoding="utf-8"?>
+<inkml:ink xmlns:inkml="http://www.w3.org/2003/InkML">
+  <inkml:definitions>
+    <inkml:context xml:id="ctx0">
+      <inkml:inkSource xml:id="inkSrc0">
+        <inkml:traceFormat>
+          <inkml:channel name="X" type="integer" min="-2.14748E9" max="2.14748E9" units="cm"/>
+          <inkml:channel name="Y" type="integer" min="-2.14748E9" max="2.14748E9" units="cm"/>
+          <inkml:channel name="F" type="integer" max="32767" units="dev"/>
+          <inkml:channel name="OA" type="integer" max="360" units="deg"/>
+          <inkml:channel name="OE" type="integer" max="90" units="deg"/>
+        </inkml:traceFormat>
+        <inkml:channelProperties>
+          <inkml:channelProperty channel="X" name="resolution" value="1000" units="1/cm"/>
+          <inkml:channelProperty channel="Y" name="resolution" value="1000" units="1/cm"/>
+          <inkml:channelProperty channel="F" name="resolution" value="0" units="1/dev"/>
+          <inkml:channelProperty channel="OA" name="resolution" value="1000" units="1/deg"/>
+          <inkml:channelProperty channel="OE" name="resolution" value="1000" units="1/deg"/>
+        </inkml:channelProperties>
+      </inkml:inkSource>
+      <inkml:timestamp xml:id="ts0" timeString="2021-01-06T19:00:42.702"/>
+    </inkml:context>
+    <inkml:brush xml:id="br0">
+      <inkml:brushProperty name="width" value="0.05" units="cm"/>
+      <inkml:brushProperty name="height" value="0.05" units="cm"/>
+      <inkml:brushProperty name="color" value="#E71224"/>
+    </inkml:brush>
+  </inkml:definitions>
+  <inkml:trace contextRef="#ctx0" brushRef="#br0">247 27 9904 0 0,'-44'-9'1967'0'0,"31"6"-349"0"0,0 0 1 0 0,1 1 0 0 0,-21-1 0 0 0,14 1-581 0 0,16 1-907 0 0,1 0-1 0 0,-1 1 1 0 0,0-1-1 0 0,1 1 1 0 0,-1 0 0 0 0,0 0-1 0 0,-5 1 1 0 0,-19-2 770 0 0,24 1-788 0 0,0-1 0 0 0,0 1 0 0 0,0 0 0 0 0,0 0 0 0 0,0 0 0 0 0,0 0 0 0 0,0 1 0 0 0,0-1 0 0 0,0 1 0 0 0,0-1 0 0 0,0 1 0 0 0,-4 2 0 0 0,6-2-30 0 0,0-1 1 0 0,-1 1-1 0 0,1 0 0 0 0,0 0 0 0 0,0 0 0 0 0,0 0 0 0 0,0 0 0 0 0,0 0 0 0 0,0 0 1 0 0,0 1-1 0 0,0-1 0 0 0,-1 3 0 0 0,2-3-56 0 0,-1 0 1 0 0,1-1-1 0 0,0 1 0 0 0,0 0 1 0 0,0 0-1 0 0,0 0 0 0 0,0 0 0 0 0,1 0 1 0 0,-1 0-1 0 0,0-1 0 0 0,0 1 1 0 0,0 0-1 0 0,1 0 0 0 0,-1 0 1 0 0,0 0-1 0 0,1-1 0 0 0,-1 1 0 0 0,1 0 1 0 0,-1 0-1 0 0,1-1 0 0 0,0 1 1 0 0,-1 0-1 0 0,2 0 0 0 0,5 6 178 0 0,0-1-1 0 0,0 0 0 0 0,1-1 0 0 0,0 1 1 0 0,0-1-1 0 0,0-1 0 0 0,1 0 1 0 0,-1 0-1 0 0,12 3 0 0 0,13 3 291 0 0,38 6 0 0 0,-64-14-439 0 0,62 8 716 0 0,129 3 0 0 0,-91-8-541 0 0,110 7 201 0 0,-178-10-308 0 0,0-3-1 0 0,50-7 1 0 0,-61 5-42 0 0,-1 0 144 0 0,0-1 0 0 0,38-11 0 0 0,-60 14-173 0 0,-4 1 11 0 0,0-1-11 0 0,3-2-121 0 0,-3 2-330 0 0</inkml:trace>
+</inkml:ink>
+</file>
+
+<file path=ppt/ink/ink4.xml><?xml version="1.0" encoding="utf-8"?>
+<inkml:ink xmlns:inkml="http://www.w3.org/2003/InkML">
+  <inkml:definitions>
+    <inkml:context xml:id="ctx0">
+      <inkml:inkSource xml:id="inkSrc0">
+        <inkml:traceFormat>
+          <inkml:channel name="X" type="integer" min="-2.14748E9" max="2.14748E9" units="cm"/>
+          <inkml:channel name="Y" type="integer" min="-2.14748E9" max="2.14748E9" units="cm"/>
+          <inkml:channel name="F" type="integer" max="32767" units="dev"/>
+          <inkml:channel name="OA" type="integer" max="360" units="deg"/>
+          <inkml:channel name="OE" type="integer" max="90" units="deg"/>
+        </inkml:traceFormat>
+        <inkml:channelProperties>
+          <inkml:channelProperty channel="X" name="resolution" value="1000" units="1/cm"/>
+          <inkml:channelProperty channel="Y" name="resolution" value="1000" units="1/cm"/>
+          <inkml:channelProperty channel="F" name="resolution" value="0" units="1/dev"/>
+          <inkml:channelProperty channel="OA" name="resolution" value="1000" units="1/deg"/>
+          <inkml:channelProperty channel="OE" name="resolution" value="1000" units="1/deg"/>
+        </inkml:channelProperties>
+      </inkml:inkSource>
+      <inkml:timestamp xml:id="ts0" timeString="2021-01-06T19:00:45.256"/>
+    </inkml:context>
+    <inkml:brush xml:id="br0">
+      <inkml:brushProperty name="width" value="0.05" units="cm"/>
+      <inkml:brushProperty name="height" value="0.05" units="cm"/>
+      <inkml:brushProperty name="color" value="#E71224"/>
+    </inkml:brush>
+  </inkml:definitions>
+  <inkml:trace contextRef="#ctx0" brushRef="#br0">116 52 4144 0 0,'-7'-1'363'0'0,"0"0"1"0"0,0-1-1 0 0,0 0 1 0 0,0 0-1 0 0,0-1 1 0 0,1 0-1 0 0,-1 0 1 0 0,-9-7-1 0 0,5 4 1690 0 0,-23-13 7354 0 0,34 21-9225 0 0,0 0-1 0 0,1 0 0 0 0,-1 0 0 0 0,0 0 0 0 0,1 0 0 0 0,-1 0 0 0 0,1 0 1 0 0,0 0-1 0 0,-1 0 0 0 0,1 0 0 0 0,0-1 0 0 0,0 1 0 0 0,1 0 0 0 0,-1 0 1 0 0,3 2-1 0 0,-1-1 2 0 0,0 0 1 0 0,0-1-1 0 0,1 1 1 0 0,-1-1-1 0 0,1 0 0 0 0,-1 0 1 0 0,6 2-1 0 0,3 1 237 0 0,1-1-1 0 0,-1-1 1 0 0,26 4-1 0 0,4-2 669 0 0,74-3-1 0 0,44-12 84 0 0,-86 4-838 0 0,385-22 980 0 0,-239 24-857 0 0,-145 4-304 0 0,-25 2 6 0 0,1 2 1 0 0,85 18-1 0 0,-131-21-143 0 0,4 1 80 0 0,1 0-1 0 0,20 1 0 0 0,-29-3-75 0 0,0 0 0 0 0,0 0 0 0 0,0 0 0 0 0,1 0 0 0 0,-1 0 0 0 0,0 0 0 0 0,0-1 0 0 0,0 1 0 0 0,0 0 0 0 0,1-1 0 0 0,-1 1 0 0 0,0-1 0 0 0,0 1 0 0 0,0-1 0 0 0,1 0 0 0 0,-2 1-28 0 0,1-1 1 0 0,-1 1 0 0 0,0-1 0 0 0,1 1 0 0 0,-1-1-1 0 0,0 0 1 0 0,0 1 0 0 0,1-1 0 0 0,-1 1 0 0 0,0-1 0 0 0,0 1-1 0 0,0-1 1 0 0,0 0 0 0 0,0 1 0 0 0,0-1 0 0 0,0 0-1 0 0,0 0-129 0 0,0-16-3690 0 0</inkml:trace>
+</inkml:ink>
+</file>
+
+<file path=ppt/ink/ink5.xml><?xml version="1.0" encoding="utf-8"?>
+<inkml:ink xmlns:inkml="http://www.w3.org/2003/InkML">
+  <inkml:definitions>
+    <inkml:context xml:id="ctx0">
+      <inkml:inkSource xml:id="inkSrc0">
+        <inkml:traceFormat>
+          <inkml:channel name="X" type="integer" min="-2.14748E9" max="2.14748E9" units="cm"/>
+          <inkml:channel name="Y" type="integer" min="-2.14748E9" max="2.14748E9" units="cm"/>
+          <inkml:channel name="F" type="integer" max="32767" units="dev"/>
+          <inkml:channel name="OA" type="integer" max="360" units="deg"/>
+          <inkml:channel name="OE" type="integer" max="90" units="deg"/>
+        </inkml:traceFormat>
+        <inkml:channelProperties>
+          <inkml:channelProperty channel="X" name="resolution" value="1000" units="1/cm"/>
+          <inkml:channelProperty channel="Y" name="resolution" value="1000" units="1/cm"/>
+          <inkml:channelProperty channel="F" name="resolution" value="0" units="1/dev"/>
+          <inkml:channelProperty channel="OA" name="resolution" value="1000" units="1/deg"/>
+          <inkml:channelProperty channel="OE" name="resolution" value="1000" units="1/deg"/>
+        </inkml:channelProperties>
+      </inkml:inkSource>
+      <inkml:timestamp xml:id="ts0" timeString="2021-01-06T19:01:01.213"/>
+    </inkml:context>
+    <inkml:brush xml:id="br0">
+      <inkml:brushProperty name="width" value="0.05" units="cm"/>
+      <inkml:brushProperty name="height" value="0.05" units="cm"/>
+      <inkml:brushProperty name="color" value="#E71224"/>
+    </inkml:brush>
+  </inkml:definitions>
+  <inkml:trace contextRef="#ctx0" brushRef="#br0">24 256 6912 0 0,'-9'1'-375'0'0,"4"-2"2427"0"0,-4 1 5444 0 0,34-11-4586 0 0,-8 6-2440 0 0,0 0-1 0 0,0 1 0 0 0,1 1 1 0 0,22-2-1 0 0,-5 1-60 0 0,182-14 1032 0 0,-62 8-586 0 0,-113 8-599 0 0,-31 2-186 0 0,1 0 0 0 0,-1 0-1 0 0,0-1 1 0 0,0-1 0 0 0,0 0 0 0 0,20-6-1 0 0,-31 8-59 0 0,1-1-1 0 0,0 1 1 0 0,-1 0 0 0 0,1 0-1 0 0,-1-1 1 0 0,1 1-1 0 0,-1-1 1 0 0,1 1 0 0 0,-1 0-1 0 0,1-1 1 0 0,-1 1-1 0 0,1-1 1 0 0,-1 1 0 0 0,1-1-1 0 0,-1 1 1 0 0,0-1-1 0 0,1 1 1 0 0,-1-1 0 0 0,1-1-1 0 0,-1 2 9 0 0,0 0-1 0 0,0-1 0 0 0,0 1 1 0 0,0-1-1 0 0,0 1 0 0 0,-1-1 1 0 0,1 1-1 0 0,0-1 0 0 0,0 1 1 0 0,0-1-1 0 0,0 1 0 0 0,-1-1 1 0 0,1 1-1 0 0,0 0 0 0 0,0-1 1 0 0,-1 1-1 0 0,1-1 0 0 0,0 1 1 0 0,-1 0-1 0 0,1-1 0 0 0,-4-2 125 0 0,0 0-1 0 0,1 1 0 0 0,-1-1 0 0 0,-6-2 0 0 0,3 2-59 0 0,-11-6-112 0 0,0 1 0 0 0,0 1-1 0 0,-1 0 1 0 0,0 2 0 0 0,-23-4 0 0 0,11 1 11 0 0,22 6 19 0 0,-61-13-35 0 0,60 14 31 0 0,1 0-1 0 0,-1 0 0 0 0,1 1 0 0 0,-1 0 0 0 0,-13 2 0 0 0,20-2 5 0 0,2 0 0 0 0,0 0-1 0 0,1 0 0 0 0,-1 0 1 0 0,0 0-1 0 0,1 0 1 0 0,-1 0-1 0 0,0 0 0 0 0,1 0 1 0 0,-1 0-1 0 0,0 1 1 0 0,1-1-1 0 0,-1 0 0 0 0,1 0 1 0 0,-1 1-1 0 0,0-1 1 0 0,1 0-1 0 0,-1 1 1 0 0,25 2-54 0 0,-3-4 175 0 0,0-1 0 0 0,0 0 0 0 0,39-11 0 0 0,59-26 387 0 0,-109 35-474 0 0,1 1 0 0 0,-1 1 0 0 0,1-1-1 0 0,-1 2 1 0 0,1 0 0 0 0,0 0 0 0 0,0 1 0 0 0,12 1-1 0 0,-19-1-20 0 0,0 1 1 0 0,0 0-1 0 0,0 0 0 0 0,0 0 0 0 0,0 0 0 0 0,0 1 0 0 0,0-1 0 0 0,0 1 0 0 0,-1 0 0 0 0,6 4 0 0 0,-6-4-7 0 0,-1 0 0 0 0,0 0-1 0 0,-1 0 1 0 0,1 1 0 0 0,0-1-1 0 0,0 0 1 0 0,-1 1-1 0 0,0-1 1 0 0,1 1 0 0 0,-1-1-1 0 0,0 1 1 0 0,0 0-1 0 0,0-1 1 0 0,-1 1 0 0 0,1 0-1 0 0,-1 0 1 0 0,1 3 0 0 0,-1 0 18 0 0,0 0 1 0 0,0 0 0 0 0,-1 0 0 0 0,0 0 0 0 0,0 0 0 0 0,0 0 0 0 0,-1 0-1 0 0,0 0 1 0 0,0-1 0 0 0,0 1 0 0 0,-1-1 0 0 0,0 1 0 0 0,0-1 0 0 0,0 0 0 0 0,-8 9-1 0 0,2-4 49 0 0,-1 1 0 0 0,-1-1 0 0 0,0-1 0 0 0,0 0-1 0 0,-19 12 1 0 0,25-19-49 0 0,0 1 0 0 0,1-1 0 0 0,-1 0 0 0 0,0 0 0 0 0,-1-1 0 0 0,1 1 1 0 0,-6 0-1 0 0,-25 7-50 0 0,35-9-516 0 0</inkml:trace>
+</inkml:ink>
+</file>
+
+<file path=ppt/ink/ink6.xml><?xml version="1.0" encoding="utf-8"?>
+<inkml:ink xmlns:inkml="http://www.w3.org/2003/InkML">
+  <inkml:definitions>
+    <inkml:context xml:id="ctx0">
+      <inkml:inkSource xml:id="inkSrc0">
+        <inkml:traceFormat>
+          <inkml:channel name="X" type="integer" min="-2.14748E9" max="2.14748E9" units="cm"/>
+          <inkml:channel name="Y" type="integer" min="-2.14748E9" max="2.14748E9" units="cm"/>
+          <inkml:channel name="F" type="integer" max="32767" units="dev"/>
+          <inkml:channel name="OA" type="integer" max="360" units="deg"/>
+          <inkml:channel name="OE" type="integer" max="90" units="deg"/>
+        </inkml:traceFormat>
+        <inkml:channelProperties>
+          <inkml:channelProperty channel="X" name="resolution" value="1000" units="1/cm"/>
+          <inkml:channelProperty channel="Y" name="resolution" value="1000" units="1/cm"/>
+          <inkml:channelProperty channel="F" name="resolution" value="0" units="1/dev"/>
+          <inkml:channelProperty channel="OA" name="resolution" value="1000" units="1/deg"/>
+          <inkml:channelProperty channel="OE" name="resolution" value="1000" units="1/deg"/>
+        </inkml:channelProperties>
+      </inkml:inkSource>
+      <inkml:timestamp xml:id="ts0" timeString="2021-01-06T19:01:15.725"/>
+    </inkml:context>
+    <inkml:brush xml:id="br0">
+      <inkml:brushProperty name="width" value="0.05" units="cm"/>
+      <inkml:brushProperty name="height" value="0.05" units="cm"/>
+      <inkml:brushProperty name="color" value="#E71224"/>
+    </inkml:brush>
+  </inkml:definitions>
+  <inkml:trace contextRef="#ctx0" brushRef="#br0">9 195 5984 0 0,'0'0'464'0'0,"-5"-11"713"0"0,2 4 3376 0 0,3 6-4192 0 0,0-1-1 0 0,0 1 0 0 0,0 0 1 0 0,0 0-1 0 0,0 0 1 0 0,1 0-1 0 0,-1 0 1 0 0,0 0-1 0 0,1-1 0 0 0,-1 1 1 0 0,1 0-1 0 0,-1 0 1 0 0,1 0-1 0 0,0 0 0 0 0,0-1 1 0 0,0 1-138 0 0,0 0 0 0 0,1 0-1 0 0,-1 0 1 0 0,0 0 0 0 0,0 1 0 0 0,1-1 0 0 0,-1 0 0 0 0,1 0 0 0 0,-1 1 0 0 0,2-1 0 0 0,4-1-122 0 0,0 1-1 0 0,0 0 1 0 0,1 0 0 0 0,8 1 0 0 0,-2-1 325 0 0,57 2 425 0 0,-47 0-524 0 0,39-3-1 0 0,-20-3-156 0 0,10 0 158 0 0,73-18 0 0 0,-119 21-503 0 0,3-1 839 0 0,-10 2-640 0 0,0 1 0 0 0,0-1 0 0 0,0 1 0 0 0,0-1 0 0 0,0 1-1 0 0,0-1 1 0 0,0 1 0 0 0,0-1 0 0 0,0 1 0 0 0,0-1 0 0 0,0 1 0 0 0,0-1 0 0 0,0 1-1 0 0,0-1 1 0 0,-1 1 0 0 0,1-1 0 0 0,0 1 0 0 0,0-1 0 0 0,-1 1 0 0 0,1-1 0 0 0,0 1-1 0 0,-1-1 1 0 0,-1-3 22 0 0,-1 1-1 0 0,0-1 1 0 0,0 1 0 0 0,0 0-1 0 0,0 0 1 0 0,-1 0-1 0 0,1 0 1 0 0,-1 0 0 0 0,0 1-1 0 0,-6-4 1 0 0,-7-2 20 0 0,-19-7 1 0 0,17 8-56 0 0,0 1 1 0 0,0 1 0 0 0,0 0-1 0 0,-1 2 1 0 0,-33-3-1 0 0,53 6-6 0 0,-1 0-1 0 0,1 0 1 0 0,-1 0 0 0 0,0 0-1 0 0,1 0 1 0 0,-1 0-1 0 0,1 0 1 0 0,-1 0 0 0 0,1 0-1 0 0,-1 0 1 0 0,0 0-1 0 0,1 0 1 0 0,-1 0 0 0 0,1 1-1 0 0,-1-1 1 0 0,1 0-1 0 0,-1 0 1 0 0,1 1-1 0 0,-1-1 1 0 0,1 0 0 0 0,-1 1-1 0 0,8 5 187 0 0,20 6 77 0 0,-6-5-170 0 0,1-2 1 0 0,0-1-1 0 0,0-1 0 0 0,0 0 0 0 0,33-2 1 0 0,-24 0 94 0 0,55 9 0 0 0,-84-10-181 0 0,0 0-1 0 0,0 1 1 0 0,0-1-1 0 0,0 1 1 0 0,-1-1-1 0 0,1 1 0 0 0,0 0 1 0 0,0 0-1 0 0,-1 0 1 0 0,1 0-1 0 0,-1 0 1 0 0,1 0-1 0 0,-1 0 1 0 0,1 0-1 0 0,-1 1 1 0 0,1-1-1 0 0,-1 1 1 0 0,0-1-1 0 0,0 1 1 0 0,1 1-1 0 0,-1-1 1 0 0,-1 0 0 0 0,1 0 1 0 0,-1-1-1 0 0,0 1 0 0 0,1 0 0 0 0,-1 0 0 0 0,0 0 0 0 0,0 0 0 0 0,-1 0 1 0 0,1 0-1 0 0,0 0 0 0 0,0-1 0 0 0,-1 1 0 0 0,1 0 0 0 0,-1 0 0 0 0,0 0 1 0 0,0-1-1 0 0,1 1 0 0 0,-1 0 0 0 0,-2 1 0 0 0,-15 25 84 0 0,-2 0 0 0 0,-31 32 0 0 0,0-1-56 0 0,0 3-1450 0 0,43-52-65 0 0,2-2-56 0 0</inkml:trace>
+</inkml:ink>
+</file>
+
+<file path=ppt/ink/ink7.xml><?xml version="1.0" encoding="utf-8"?>
+<inkml:ink xmlns:inkml="http://www.w3.org/2003/InkML">
+  <inkml:definitions>
+    <inkml:context xml:id="ctx0">
+      <inkml:inkSource xml:id="inkSrc0">
+        <inkml:traceFormat>
+          <inkml:channel name="X" type="integer" min="-2.14748E9" max="2.14748E9" units="cm"/>
+          <inkml:channel name="Y" type="integer" min="-2.14748E9" max="2.14748E9" units="cm"/>
+          <inkml:channel name="F" type="integer" max="32767" units="dev"/>
+          <inkml:channel name="OA" type="integer" max="360" units="deg"/>
+          <inkml:channel name="OE" type="integer" max="90" units="deg"/>
+        </inkml:traceFormat>
+        <inkml:channelProperties>
+          <inkml:channelProperty channel="X" name="resolution" value="1000" units="1/cm"/>
+          <inkml:channelProperty channel="Y" name="resolution" value="1000" units="1/cm"/>
+          <inkml:channelProperty channel="F" name="resolution" value="0" units="1/dev"/>
+          <inkml:channelProperty channel="OA" name="resolution" value="1000" units="1/deg"/>
+          <inkml:channelProperty channel="OE" name="resolution" value="1000" units="1/deg"/>
+        </inkml:channelProperties>
+      </inkml:inkSource>
+      <inkml:timestamp xml:id="ts0" timeString="2021-01-06T19:01:16.538"/>
+    </inkml:context>
+    <inkml:brush xml:id="br0">
+      <inkml:brushProperty name="width" value="0.05" units="cm"/>
+      <inkml:brushProperty name="height" value="0.05" units="cm"/>
+      <inkml:brushProperty name="color" value="#E71224"/>
+    </inkml:brush>
+  </inkml:definitions>
+  <inkml:trace contextRef="#ctx0" brushRef="#br0">37 283 12408 0 0,'-29'-37'1344'0'0,"28"36"-1221"0"0,0 1 0 0 0,1-1 0 0 0,-1 1 0 0 0,1-1 0 0 0,-1 1 0 0 0,1-1 0 0 0,-1 1 0 0 0,1-1 0 0 0,0 1 0 0 0,-1-1 0 0 0,1 0 1 0 0,0 1-1 0 0,-1-1 0 0 0,1 1 0 0 0,0-1 0 0 0,0 0 0 0 0,0 1 0 0 0,-1-1 0 0 0,1 0 0 0 0,0 1 0 0 0,0-1 0 0 0,0 0 0 0 0,0 0 0 0 0,0 1 1 0 0,0-1-1 0 0,0 0 0 0 0,0 1 0 0 0,1-2 0 0 0,0 1 184 0 0,0 0-1 0 0,1 0 1 0 0,-1-1 0 0 0,0 1 0 0 0,1 0-1 0 0,-1 1 1 0 0,1-1 0 0 0,-1 0 0 0 0,1 0-1 0 0,0 1 1 0 0,2-1 0 0 0,20-7-153 0 0,1 2 0 0 0,32-3-1 0 0,108-2 1254 0 0,-29 4-782 0 0,-122 5-625 0 0,-3 2 0 0 0,-1-1 0 0 0,1-1 0 0 0,-1 1 0 0 0,1-2 0 0 0,-1 0 0 0 0,0 0 0 0 0,0 0 0 0 0,12-7 0 0 0,-21 10 0 0 0,-1-1 0 0 0,0 1 0 0 0,1 0 0 0 0,-1 0 0 0 0,1-1 0 0 0,-1 1 0 0 0,0 0 0 0 0,1-1 0 0 0,-1 1 0 0 0,0 0 0 0 0,1-1 0 0 0,-1 1 0 0 0,0-1 0 0 0,1 1 0 0 0,-1-1 0 0 0,0 1 0 0 0,0 0 0 0 0,0-1 0 0 0,1 1 0 0 0,-1-1 0 0 0,0 1 0 0 0,0-1 0 0 0,0 1 0 0 0,0-1 0 0 0,0 1 0 0 0,0-1 0 0 0,0 1 0 0 0,0-2 0 0 0,-1 1 0 0 0,1 0 0 0 0,0 0 0 0 0,-1 0 0 0 0,0 0 0 0 0,1 0 0 0 0,-1 0 0 0 0,0 0 0 0 0,1 1 0 0 0,-1-1 0 0 0,0 0 0 0 0,-1-1 0 0 0,-3-2 0 0 0,0 1 0 0 0,0 0 0 0 0,-9-5 0 0 0,-30-12 293 0 0,13 5 597 0 0,-54-17-1 0 0,47 15-889 0 0,31 14-45 0 0,-1-1-1 0 0,1 1 0 0 0,-1 0 1 0 0,-9-2-1 0 0,6 3 126 0 0,17 3 31 0 0,19 3-66 0 0,79 0 391 0 0,-19-4 713 0 0,-32-2-694 0 0,-45 2-455 0 0,-3 0 0 0 0,-1-1 0 0 0,0 2 0 0 0,0-1 0 0 0,0 0 0 0 0,0 1 0 0 0,5 1 0 0 0,-9-2 0 0 0,0 0 0 0 0,1 0 0 0 0,-1 1 0 0 0,1-1 0 0 0,-1 0 0 0 0,0 0 0 0 0,1 0 0 0 0,-1 1 0 0 0,0-1 0 0 0,0 0 0 0 0,1 1 0 0 0,-1-1 0 0 0,0 0 0 0 0,0 1 0 0 0,1-1 0 0 0,-1 0 0 0 0,0 1 0 0 0,0-1 0 0 0,0 1 0 0 0,1-1 0 0 0,-1 0 0 0 0,0 1 0 0 0,0-1 0 0 0,0 1 0 0 0,0-1 0 0 0,0 0 0 0 0,0 1 0 0 0,0-1 0 0 0,0 1 0 0 0,0-1 0 0 0,0 0 0 0 0,0 1 0 0 0,0-1 0 0 0,0 1 0 0 0,-1-1 0 0 0,1 0 0 0 0,0 1 0 0 0,0-1 0 0 0,0 1 0 0 0,-1-1 0 0 0,1 0 0 0 0,0 1 0 0 0,0-1 0 0 0,-1 0 0 0 0,1 1 0 0 0,0-1 0 0 0,0 0 0 0 0,-1 0 0 0 0,1 1 0 0 0,-1-1 0 0 0,1 1 0 0 0,-21 37-111 0 0,5-11-333 0 0,-16 40-1 0 0,29-58 335 0 0,0 0 0 0 0,0 0 0 0 0,1 0 0 0 0,0 1 0 0 0,0-1 0 0 0,1 0 0 0 0,1 1 0 0 0,-1-1 0 0 0,2 10 0 0 0,0-15-712 0 0,0 0-1 0 0,0 0 0 0 0,1 0 1 0 0,-1 0-1 0 0,1 0 0 0 0,0 0 1 0 0,4 5-1 0 0,1 0-6343 0 0</inkml:trace>
+</inkml:ink>
+</file>
+
+<file path=ppt/ink/ink8.xml><?xml version="1.0" encoding="utf-8"?>
+<inkml:ink xmlns:inkml="http://www.w3.org/2003/InkML">
+  <inkml:definitions>
+    <inkml:context xml:id="ctx0">
+      <inkml:inkSource xml:id="inkSrc0">
+        <inkml:traceFormat>
+          <inkml:channel name="X" type="integer" min="-2.14748E9" max="2.14748E9" units="cm"/>
+          <inkml:channel name="Y" type="integer" min="-2.14748E9" max="2.14748E9" units="cm"/>
+          <inkml:channel name="F" type="integer" max="32767" units="dev"/>
+          <inkml:channel name="OA" type="integer" max="360" units="deg"/>
+          <inkml:channel name="OE" type="integer" max="90" units="deg"/>
+        </inkml:traceFormat>
+        <inkml:channelProperties>
+          <inkml:channelProperty channel="X" name="resolution" value="1000" units="1/cm"/>
+          <inkml:channelProperty channel="Y" name="resolution" value="1000" units="1/cm"/>
+          <inkml:channelProperty channel="F" name="resolution" value="0" units="1/dev"/>
+          <inkml:channelProperty channel="OA" name="resolution" value="1000" units="1/deg"/>
+          <inkml:channelProperty channel="OE" name="resolution" value="1000" units="1/deg"/>
+        </inkml:channelProperties>
+      </inkml:inkSource>
+      <inkml:timestamp xml:id="ts0" timeString="2021-01-06T19:01:18.958"/>
+    </inkml:context>
+    <inkml:brush xml:id="br0">
+      <inkml:brushProperty name="width" value="0.05" units="cm"/>
+      <inkml:brushProperty name="height" value="0.05" units="cm"/>
+      <inkml:brushProperty name="color" value="#E71224"/>
+    </inkml:brush>
+  </inkml:definitions>
+  <inkml:trace contextRef="#ctx0" brushRef="#br0">221 88 6912 0 0,'-59'20'3561'0'0,"51"-17"-2399"0"0,7-2-989 0 0,0-1 0 0 0,0 1 0 0 0,0-1 0 0 0,0 1 0 0 0,0-1 1 0 0,0 0-1 0 0,-1 0 0 0 0,1 1 0 0 0,0-1 0 0 0,0 0 0 0 0,0 0 1 0 0,0 0-1 0 0,0 0 0 0 0,0 0 0 0 0,-1 0 0 0 0,1 0 1 0 0,0-1-1 0 0,-2 0 876 0 0,3 1-977 0 0,0 0 0 0 0,-1 0-1 0 0,1 0 1 0 0,0 0 0 0 0,0 0 0 0 0,-1 0 0 0 0,1 0-1 0 0,0-1 1 0 0,0 1 0 0 0,0 0 0 0 0,0 0 0 0 0,-1 0 0 0 0,1 0-1 0 0,0-1 1 0 0,0 1 0 0 0,0 0 0 0 0,0 0 0 0 0,0 0 0 0 0,0-1-1 0 0,-1 1 1 0 0,1 0 0 0 0,0 0 0 0 0,0 0 0 0 0,0-1-1 0 0,0 1 1 0 0,0 0 0 0 0,0 0 0 0 0,0-1 0 0 0,0 1 0 0 0,0 0-1 0 0,0 0 1 0 0,0 0 0 0 0,0-1 0 0 0,0 1 0 0 0,0 0 0 0 0,0 0-1 0 0,0-1 1 0 0,0 1 0 0 0,1 0 0 0 0,0-12 773 0 0,-1 12-647 0 0,1-3-53 0 0,0 1 1 0 0,-1-1-1 0 0,1 1 1 0 0,0-1-1 0 0,1 1 1 0 0,-1 0-1 0 0,0 0 0 0 0,1-1 1 0 0,-1 1-1 0 0,1 0 1 0 0,0 0-1 0 0,0 0 1 0 0,-1 1-1 0 0,1-1 1 0 0,0 0-1 0 0,4-1 1 0 0,4-3 149 0 0,0 0 1 0 0,16-6 0 0 0,-13 6 18 0 0,-2 1-127 0 0,-1 1-1 0 0,1 0 0 0 0,0 1 1 0 0,0 0-1 0 0,0 1 0 0 0,13-2 1 0 0,-19 4-100 0 0,1 0 0 0 0,-1-1 0 0 0,1 2 0 0 0,-1-1 0 0 0,1 1 0 0 0,-1 0 0 0 0,1 0 0 0 0,-1 0 0 0 0,0 1 0 0 0,1 0 1 0 0,-1 0-1 0 0,0 0 0 0 0,0 1 0 0 0,8 5 0 0 0,-11-6-68 0 0,1 1 1 0 0,0 0-1 0 0,-1 0 1 0 0,0 0-1 0 0,0 0 0 0 0,0 0 1 0 0,0 0-1 0 0,0 1 1 0 0,-1-1-1 0 0,1 1 1 0 0,-1-1-1 0 0,0 1 0 0 0,1 5 1 0 0,-1 0 13 0 0,1 0 0 0 0,-1 0 0 0 0,-1-1 0 0 0,-1 17 0 0 0,-1-4 16 0 0,-2 0-1 0 0,-1 0 0 0 0,-12 33 1 0 0,-33 58 93 0 0,26-66-87 0 0,-48 67 1 0 0,59-94-16 0 0,-2-1 1 0 0,0 0 0 0 0,-2-1-1 0 0,0-1 1 0 0,-35 26 0 0 0,41-34 88 0 0,0-2-1 0 0,-17 9 1 0 0,24-14-138 0 0,1 1-1 0 0,-1-1 0 0 0,0 0 1 0 0,0 0-1 0 0,0 0 0 0 0,0 0 1 0 0,0-1-1 0 0,0 1 0 0 0,0-1 1 0 0,0 0-1 0 0,-7-1 1 0 0,10 1 9 0 0,1 0 0 0 0,-1 0 0 0 0,0 0 1 0 0,0 0-1 0 0,1-1 0 0 0,-1 1 1 0 0,0 0-1 0 0,1 0 0 0 0,-1-1 1 0 0,0 1-1 0 0,1 0 0 0 0,-1 0 1 0 0,1-1-1 0 0,-1 1 0 0 0,0-1 1 0 0,1 1-1 0 0,-1-1 0 0 0,1 1 1 0 0,-1-1-1 0 0,1 1 0 0 0,0-1 1 0 0,-1 1-1 0 0,1-1 0 0 0,-1 1 1 0 0,1-1-1 0 0,-1-1 0 0 0,1 2 5 0 0,1-1-1 0 0,-1 0 1 0 0,0 0-1 0 0,0 0 0 0 0,0 0 1 0 0,1 0-1 0 0,-1 1 1 0 0,0-1-1 0 0,1 0 1 0 0,-1 0-1 0 0,1 1 0 0 0,-1-1 1 0 0,1 0-1 0 0,-1 0 1 0 0,1 1-1 0 0,-1-1 0 0 0,2 0 1 0 0,2-3 17 0 0,1 0 1 0 0,-1 1-1 0 0,1 0 0 0 0,0 0 1 0 0,6-3-1 0 0,22-7 345 0 0,0 1-1 0 0,60-13 1 0 0,-48 15-179 0 0,-22 4-88 0 0,31-3 0 0 0,-12 7-143 0 0,74 4-1 0 0,-108-2-319 0 0,0 0 1 0 0,0 0-1 0 0,0 0 0 0 0,12-3 0 0 0,-16 2 96 0 0,-1 0 0 0 0,1 0 0 0 0,0-1 0 0 0,-1 1 0 0 0,0-1 0 0 0,1 1 0 0 0,-1-1 0 0 0,0 0 0 0 0,0 0 0 0 0,0-1 0 0 0,0 1 0 0 0,3-3 0 0 0,5-12-1233 0 0</inkml:trace>
+</inkml:ink>
+</file>
+
+<file path=ppt/ink/ink9.xml><?xml version="1.0" encoding="utf-8"?>
+<inkml:ink xmlns:inkml="http://www.w3.org/2003/InkML">
+  <inkml:definitions>
+    <inkml:context xml:id="ctx0">
+      <inkml:inkSource xml:id="inkSrc0">
+        <inkml:traceFormat>
+          <inkml:channel name="X" type="integer" min="-2.14748E9" max="2.14748E9" units="cm"/>
+          <inkml:channel name="Y" type="integer" min="-2.14748E9" max="2.14748E9" units="cm"/>
+          <inkml:channel name="F" type="integer" max="32767" units="dev"/>
+          <inkml:channel name="OA" type="integer" max="360" units="deg"/>
+          <inkml:channel name="OE" type="integer" max="90" units="deg"/>
+        </inkml:traceFormat>
+        <inkml:channelProperties>
+          <inkml:channelProperty channel="X" name="resolution" value="1000" units="1/cm"/>
+          <inkml:channelProperty channel="Y" name="resolution" value="1000" units="1/cm"/>
+          <inkml:channelProperty channel="F" name="resolution" value="0" units="1/dev"/>
+          <inkml:channelProperty channel="OA" name="resolution" value="1000" units="1/deg"/>
+          <inkml:channelProperty channel="OE" name="resolution" value="1000" units="1/deg"/>
+        </inkml:channelProperties>
+      </inkml:inkSource>
+      <inkml:timestamp xml:id="ts0" timeString="2021-01-06T19:01:19.292"/>
+    </inkml:context>
+    <inkml:brush xml:id="br0">
+      <inkml:brushProperty name="width" value="0.05" units="cm"/>
+      <inkml:brushProperty name="height" value="0.05" units="cm"/>
+      <inkml:brushProperty name="color" value="#E71224"/>
+    </inkml:brush>
+  </inkml:definitions>
+  <inkml:trace contextRef="#ctx0" brushRef="#br0">0 112 19351 0 0,'0'0'1751'0'0,"7"-4"-1406"0"0,7-2 703 0 0,0 0 0 0 0,1 1 0 0 0,29-7 0 0 0,-20 6-1144 0 0,132-32 2139 0 0,-146 36-2166 0 0,46-13 65 0 0,-18 2-3610 0 0,-24 8-4973 0 0</inkml:trace>
+</inkml:ink>
 </file>
 
 <file path=ppt/notesMasters/notesMaster1.xml><?xml version="1.0" encoding="utf-8"?>
@@ -836,7 +1446,7 @@
           <a:p>
             <a:fld id="{3A2BF66F-FEB0-48C1-A8B9-A73F54BB1A08}" type="datetimeFigureOut">
               <a:rPr lang="en-US" smtClean="0"/>
-              <a:t>1/5/2021</a:t>
+              <a:t>1/6/2021</a:t>
             </a:fld>
             <a:endParaRPr lang="en-US"/>
           </a:p>
@@ -1044,7 +1654,7 @@
           <a:p>
             <a:fld id="{3A2BF66F-FEB0-48C1-A8B9-A73F54BB1A08}" type="datetimeFigureOut">
               <a:rPr lang="en-US" smtClean="0"/>
-              <a:t>1/5/2021</a:t>
+              <a:t>1/6/2021</a:t>
             </a:fld>
             <a:endParaRPr lang="en-US"/>
           </a:p>
@@ -1262,7 +1872,7 @@
           <a:p>
             <a:fld id="{3A2BF66F-FEB0-48C1-A8B9-A73F54BB1A08}" type="datetimeFigureOut">
               <a:rPr lang="en-US" smtClean="0"/>
-              <a:t>1/5/2021</a:t>
+              <a:t>1/6/2021</a:t>
             </a:fld>
             <a:endParaRPr lang="en-US"/>
           </a:p>
@@ -1470,7 +2080,7 @@
           <a:p>
             <a:fld id="{3A2BF66F-FEB0-48C1-A8B9-A73F54BB1A08}" type="datetimeFigureOut">
               <a:rPr lang="en-US" smtClean="0"/>
-              <a:t>1/5/2021</a:t>
+              <a:t>1/6/2021</a:t>
             </a:fld>
             <a:endParaRPr lang="en-US"/>
           </a:p>
@@ -1755,7 +2365,7 @@
           <a:p>
             <a:fld id="{3A2BF66F-FEB0-48C1-A8B9-A73F54BB1A08}" type="datetimeFigureOut">
               <a:rPr lang="en-US" smtClean="0"/>
-              <a:t>1/5/2021</a:t>
+              <a:t>1/6/2021</a:t>
             </a:fld>
             <a:endParaRPr lang="en-US"/>
           </a:p>
@@ -2030,7 +2640,7 @@
           <a:p>
             <a:fld id="{3A2BF66F-FEB0-48C1-A8B9-A73F54BB1A08}" type="datetimeFigureOut">
               <a:rPr lang="en-US" smtClean="0"/>
-              <a:t>1/5/2021</a:t>
+              <a:t>1/6/2021</a:t>
             </a:fld>
             <a:endParaRPr lang="en-US"/>
           </a:p>
@@ -2452,7 +3062,7 @@
           <a:p>
             <a:fld id="{3A2BF66F-FEB0-48C1-A8B9-A73F54BB1A08}" type="datetimeFigureOut">
               <a:rPr lang="en-US" smtClean="0"/>
-              <a:t>1/5/2021</a:t>
+              <a:t>1/6/2021</a:t>
             </a:fld>
             <a:endParaRPr lang="en-US"/>
           </a:p>
@@ -2603,7 +3213,7 @@
           <a:p>
             <a:fld id="{3A2BF66F-FEB0-48C1-A8B9-A73F54BB1A08}" type="datetimeFigureOut">
               <a:rPr lang="en-US" smtClean="0"/>
-              <a:t>1/5/2021</a:t>
+              <a:t>1/6/2021</a:t>
             </a:fld>
             <a:endParaRPr lang="en-US"/>
           </a:p>
@@ -2726,7 +3336,7 @@
           <a:p>
             <a:fld id="{3A2BF66F-FEB0-48C1-A8B9-A73F54BB1A08}" type="datetimeFigureOut">
               <a:rPr lang="en-US" smtClean="0"/>
-              <a:t>1/5/2021</a:t>
+              <a:t>1/6/2021</a:t>
             </a:fld>
             <a:endParaRPr lang="en-US"/>
           </a:p>
@@ -3046,7 +3656,7 @@
           <a:p>
             <a:fld id="{3A2BF66F-FEB0-48C1-A8B9-A73F54BB1A08}" type="datetimeFigureOut">
               <a:rPr lang="en-US" smtClean="0"/>
-              <a:t>1/5/2021</a:t>
+              <a:t>1/6/2021</a:t>
             </a:fld>
             <a:endParaRPr lang="en-US"/>
           </a:p>
@@ -3344,7 +3954,7 @@
           <a:p>
             <a:fld id="{3A2BF66F-FEB0-48C1-A8B9-A73F54BB1A08}" type="datetimeFigureOut">
               <a:rPr lang="en-US" smtClean="0"/>
-              <a:t>1/5/2021</a:t>
+              <a:t>1/6/2021</a:t>
             </a:fld>
             <a:endParaRPr lang="en-US"/>
           </a:p>
@@ -3595,7 +4205,7 @@
           <a:p>
             <a:fld id="{3A2BF66F-FEB0-48C1-A8B9-A73F54BB1A08}" type="datetimeFigureOut">
               <a:rPr lang="en-US" smtClean="0"/>
-              <a:t>1/5/2021</a:t>
+              <a:t>1/6/2021</a:t>
             </a:fld>
             <a:endParaRPr lang="en-US"/>
           </a:p>
@@ -4254,6 +4864,210 @@
           </a:p>
         </p:txBody>
       </p:sp>
+      <mc:AlternateContent xmlns:mc="http://schemas.openxmlformats.org/markup-compatibility/2006">
+        <mc:Choice xmlns:p14="http://schemas.microsoft.com/office/powerpoint/2010/main" Requires="p14">
+          <p:contentPart p14:bwMode="auto" r:id="rId2">
+            <p14:nvContentPartPr>
+              <p14:cNvPr id="4" name="Ink 3">
+                <a:extLst>
+                  <a:ext uri="{FF2B5EF4-FFF2-40B4-BE49-F238E27FC236}">
+                    <a16:creationId xmlns:a16="http://schemas.microsoft.com/office/drawing/2014/main" id="{B91FC0B8-5A85-4042-9AF0-4FB3406C8D98}"/>
+                  </a:ext>
+                </a:extLst>
+              </p14:cNvPr>
+              <p14:cNvContentPartPr/>
+              <p14:nvPr/>
+            </p14:nvContentPartPr>
+            <p14:xfrm>
+              <a:off x="808849" y="1711759"/>
+              <a:ext cx="721440" cy="43560"/>
+            </p14:xfrm>
+          </p:contentPart>
+        </mc:Choice>
+        <mc:Fallback>
+          <p:pic>
+            <p:nvPicPr>
+              <p:cNvPr id="4" name="Ink 3">
+                <a:extLst>
+                  <a:ext uri="{FF2B5EF4-FFF2-40B4-BE49-F238E27FC236}">
+                    <a16:creationId xmlns:a16="http://schemas.microsoft.com/office/drawing/2014/main" id="{B91FC0B8-5A85-4042-9AF0-4FB3406C8D98}"/>
+                  </a:ext>
+                </a:extLst>
+              </p:cNvPr>
+              <p:cNvPicPr/>
+              <p:nvPr/>
+            </p:nvPicPr>
+            <p:blipFill>
+              <a:blip r:embed="rId3"/>
+              <a:stretch>
+                <a:fillRect/>
+              </a:stretch>
+            </p:blipFill>
+            <p:spPr>
+              <a:xfrm>
+                <a:off x="799849" y="1702759"/>
+                <a:ext cx="739080" cy="61200"/>
+              </a:xfrm>
+              <a:prstGeom prst="rect">
+                <a:avLst/>
+              </a:prstGeom>
+            </p:spPr>
+          </p:pic>
+        </mc:Fallback>
+      </mc:AlternateContent>
+      <mc:AlternateContent xmlns:mc="http://schemas.openxmlformats.org/markup-compatibility/2006">
+        <mc:Choice xmlns:p14="http://schemas.microsoft.com/office/powerpoint/2010/main" Requires="p14">
+          <p:contentPart p14:bwMode="auto" r:id="rId4">
+            <p14:nvContentPartPr>
+              <p14:cNvPr id="5" name="Ink 4">
+                <a:extLst>
+                  <a:ext uri="{FF2B5EF4-FFF2-40B4-BE49-F238E27FC236}">
+                    <a16:creationId xmlns:a16="http://schemas.microsoft.com/office/drawing/2014/main" id="{A4E51570-BF00-4943-B3B2-62FB162F0EF7}"/>
+                  </a:ext>
+                </a:extLst>
+              </p14:cNvPr>
+              <p14:cNvContentPartPr/>
+              <p14:nvPr/>
+            </p14:nvContentPartPr>
+            <p14:xfrm>
+              <a:off x="864289" y="2143759"/>
+              <a:ext cx="743040" cy="77400"/>
+            </p14:xfrm>
+          </p:contentPart>
+        </mc:Choice>
+        <mc:Fallback>
+          <p:pic>
+            <p:nvPicPr>
+              <p:cNvPr id="5" name="Ink 4">
+                <a:extLst>
+                  <a:ext uri="{FF2B5EF4-FFF2-40B4-BE49-F238E27FC236}">
+                    <a16:creationId xmlns:a16="http://schemas.microsoft.com/office/drawing/2014/main" id="{A4E51570-BF00-4943-B3B2-62FB162F0EF7}"/>
+                  </a:ext>
+                </a:extLst>
+              </p:cNvPr>
+              <p:cNvPicPr/>
+              <p:nvPr/>
+            </p:nvPicPr>
+            <p:blipFill>
+              <a:blip r:embed="rId5"/>
+              <a:stretch>
+                <a:fillRect/>
+              </a:stretch>
+            </p:blipFill>
+            <p:spPr>
+              <a:xfrm>
+                <a:off x="855649" y="2135119"/>
+                <a:ext cx="760680" cy="95040"/>
+              </a:xfrm>
+              <a:prstGeom prst="rect">
+                <a:avLst/>
+              </a:prstGeom>
+            </p:spPr>
+          </p:pic>
+        </mc:Fallback>
+      </mc:AlternateContent>
+      <mc:AlternateContent xmlns:mc="http://schemas.openxmlformats.org/markup-compatibility/2006">
+        <mc:Choice xmlns:p14="http://schemas.microsoft.com/office/powerpoint/2010/main" Requires="p14">
+          <p:contentPart p14:bwMode="auto" r:id="rId6">
+            <p14:nvContentPartPr>
+              <p14:cNvPr id="6" name="Ink 5">
+                <a:extLst>
+                  <a:ext uri="{FF2B5EF4-FFF2-40B4-BE49-F238E27FC236}">
+                    <a16:creationId xmlns:a16="http://schemas.microsoft.com/office/drawing/2014/main" id="{DA768547-779C-4D47-A03E-5AA654B21911}"/>
+                  </a:ext>
+                </a:extLst>
+              </p14:cNvPr>
+              <p14:cNvContentPartPr/>
+              <p14:nvPr/>
+            </p14:nvContentPartPr>
+            <p14:xfrm>
+              <a:off x="845929" y="2553079"/>
+              <a:ext cx="405720" cy="60120"/>
+            </p14:xfrm>
+          </p:contentPart>
+        </mc:Choice>
+        <mc:Fallback>
+          <p:pic>
+            <p:nvPicPr>
+              <p:cNvPr id="6" name="Ink 5">
+                <a:extLst>
+                  <a:ext uri="{FF2B5EF4-FFF2-40B4-BE49-F238E27FC236}">
+                    <a16:creationId xmlns:a16="http://schemas.microsoft.com/office/drawing/2014/main" id="{DA768547-779C-4D47-A03E-5AA654B21911}"/>
+                  </a:ext>
+                </a:extLst>
+              </p:cNvPr>
+              <p:cNvPicPr/>
+              <p:nvPr/>
+            </p:nvPicPr>
+            <p:blipFill>
+              <a:blip r:embed="rId7"/>
+              <a:stretch>
+                <a:fillRect/>
+              </a:stretch>
+            </p:blipFill>
+            <p:spPr>
+              <a:xfrm>
+                <a:off x="836929" y="2544439"/>
+                <a:ext cx="423360" cy="77760"/>
+              </a:xfrm>
+              <a:prstGeom prst="rect">
+                <a:avLst/>
+              </a:prstGeom>
+            </p:spPr>
+          </p:pic>
+        </mc:Fallback>
+      </mc:AlternateContent>
+      <mc:AlternateContent xmlns:mc="http://schemas.openxmlformats.org/markup-compatibility/2006">
+        <mc:Choice xmlns:p14="http://schemas.microsoft.com/office/powerpoint/2010/main" Requires="p14">
+          <p:contentPart p14:bwMode="auto" r:id="rId8">
+            <p14:nvContentPartPr>
+              <p14:cNvPr id="7" name="Ink 6">
+                <a:extLst>
+                  <a:ext uri="{FF2B5EF4-FFF2-40B4-BE49-F238E27FC236}">
+                    <a16:creationId xmlns:a16="http://schemas.microsoft.com/office/drawing/2014/main" id="{80E746A9-3A2B-43E4-9FD3-7EAB4056882E}"/>
+                  </a:ext>
+                </a:extLst>
+              </p14:cNvPr>
+              <p14:cNvContentPartPr/>
+              <p14:nvPr/>
+            </p14:nvContentPartPr>
+            <p14:xfrm>
+              <a:off x="3173689" y="2562079"/>
+              <a:ext cx="569160" cy="29160"/>
+            </p14:xfrm>
+          </p:contentPart>
+        </mc:Choice>
+        <mc:Fallback>
+          <p:pic>
+            <p:nvPicPr>
+              <p:cNvPr id="7" name="Ink 6">
+                <a:extLst>
+                  <a:ext uri="{FF2B5EF4-FFF2-40B4-BE49-F238E27FC236}">
+                    <a16:creationId xmlns:a16="http://schemas.microsoft.com/office/drawing/2014/main" id="{80E746A9-3A2B-43E4-9FD3-7EAB4056882E}"/>
+                  </a:ext>
+                </a:extLst>
+              </p:cNvPr>
+              <p:cNvPicPr/>
+              <p:nvPr/>
+            </p:nvPicPr>
+            <p:blipFill>
+              <a:blip r:embed="rId9"/>
+              <a:stretch>
+                <a:fillRect/>
+              </a:stretch>
+            </p:blipFill>
+            <p:spPr>
+              <a:xfrm>
+                <a:off x="3164689" y="2553079"/>
+                <a:ext cx="586800" cy="46800"/>
+              </a:xfrm>
+              <a:prstGeom prst="rect">
+                <a:avLst/>
+              </a:prstGeom>
+            </p:spPr>
+          </p:pic>
+        </mc:Fallback>
+      </mc:AlternateContent>
     </p:spTree>
     <p:extLst>
       <p:ext uri="{BB962C8B-B14F-4D97-AF65-F5344CB8AC3E}">
@@ -4363,6 +5177,813 @@
           </a:p>
         </p:txBody>
       </p:sp>
+      <mc:AlternateContent xmlns:mc="http://schemas.openxmlformats.org/markup-compatibility/2006">
+        <mc:Choice xmlns:p14="http://schemas.microsoft.com/office/powerpoint/2010/main" Requires="p14">
+          <p:contentPart p14:bwMode="auto" r:id="rId2">
+            <p14:nvContentPartPr>
+              <p14:cNvPr id="4" name="Ink 3">
+                <a:extLst>
+                  <a:ext uri="{FF2B5EF4-FFF2-40B4-BE49-F238E27FC236}">
+                    <a16:creationId xmlns:a16="http://schemas.microsoft.com/office/drawing/2014/main" id="{8B1F6CA9-FF8B-414D-8F02-2925805703B3}"/>
+                  </a:ext>
+                </a:extLst>
+              </p14:cNvPr>
+              <p14:cNvContentPartPr/>
+              <p14:nvPr/>
+            </p14:nvContentPartPr>
+            <p14:xfrm>
+              <a:off x="488449" y="1513759"/>
+              <a:ext cx="277920" cy="95040"/>
+            </p14:xfrm>
+          </p:contentPart>
+        </mc:Choice>
+        <mc:Fallback>
+          <p:pic>
+            <p:nvPicPr>
+              <p:cNvPr id="4" name="Ink 3">
+                <a:extLst>
+                  <a:ext uri="{FF2B5EF4-FFF2-40B4-BE49-F238E27FC236}">
+                    <a16:creationId xmlns:a16="http://schemas.microsoft.com/office/drawing/2014/main" id="{8B1F6CA9-FF8B-414D-8F02-2925805703B3}"/>
+                  </a:ext>
+                </a:extLst>
+              </p:cNvPr>
+              <p:cNvPicPr/>
+              <p:nvPr/>
+            </p:nvPicPr>
+            <p:blipFill>
+              <a:blip r:embed="rId3"/>
+              <a:stretch>
+                <a:fillRect/>
+              </a:stretch>
+            </p:blipFill>
+            <p:spPr>
+              <a:xfrm>
+                <a:off x="479809" y="1505119"/>
+                <a:ext cx="295560" cy="112680"/>
+              </a:xfrm>
+              <a:prstGeom prst="rect">
+                <a:avLst/>
+              </a:prstGeom>
+            </p:spPr>
+          </p:pic>
+        </mc:Fallback>
+      </mc:AlternateContent>
+      <mc:AlternateContent xmlns:mc="http://schemas.openxmlformats.org/markup-compatibility/2006">
+        <mc:Choice xmlns:p14="http://schemas.microsoft.com/office/powerpoint/2010/main" Requires="p14">
+          <p:contentPart p14:bwMode="auto" r:id="rId4">
+            <p14:nvContentPartPr>
+              <p14:cNvPr id="5" name="Ink 4">
+                <a:extLst>
+                  <a:ext uri="{FF2B5EF4-FFF2-40B4-BE49-F238E27FC236}">
+                    <a16:creationId xmlns:a16="http://schemas.microsoft.com/office/drawing/2014/main" id="{3F28D829-074B-40AB-9427-CDBAE9ACA9CC}"/>
+                  </a:ext>
+                </a:extLst>
+              </p14:cNvPr>
+              <p14:cNvContentPartPr/>
+              <p14:nvPr/>
+            </p14:nvContentPartPr>
+            <p14:xfrm>
+              <a:off x="534169" y="2363719"/>
+              <a:ext cx="205920" cy="134280"/>
+            </p14:xfrm>
+          </p:contentPart>
+        </mc:Choice>
+        <mc:Fallback>
+          <p:pic>
+            <p:nvPicPr>
+              <p:cNvPr id="5" name="Ink 4">
+                <a:extLst>
+                  <a:ext uri="{FF2B5EF4-FFF2-40B4-BE49-F238E27FC236}">
+                    <a16:creationId xmlns:a16="http://schemas.microsoft.com/office/drawing/2014/main" id="{3F28D829-074B-40AB-9427-CDBAE9ACA9CC}"/>
+                  </a:ext>
+                </a:extLst>
+              </p:cNvPr>
+              <p:cNvPicPr/>
+              <p:nvPr/>
+            </p:nvPicPr>
+            <p:blipFill>
+              <a:blip r:embed="rId5"/>
+              <a:stretch>
+                <a:fillRect/>
+              </a:stretch>
+            </p:blipFill>
+            <p:spPr>
+              <a:xfrm>
+                <a:off x="525529" y="2355079"/>
+                <a:ext cx="223560" cy="151920"/>
+              </a:xfrm>
+              <a:prstGeom prst="rect">
+                <a:avLst/>
+              </a:prstGeom>
+            </p:spPr>
+          </p:pic>
+        </mc:Fallback>
+      </mc:AlternateContent>
+      <mc:AlternateContent xmlns:mc="http://schemas.openxmlformats.org/markup-compatibility/2006">
+        <mc:Choice xmlns:p14="http://schemas.microsoft.com/office/powerpoint/2010/main" Requires="p14">
+          <p:contentPart p14:bwMode="auto" r:id="rId6">
+            <p14:nvContentPartPr>
+              <p14:cNvPr id="6" name="Ink 5">
+                <a:extLst>
+                  <a:ext uri="{FF2B5EF4-FFF2-40B4-BE49-F238E27FC236}">
+                    <a16:creationId xmlns:a16="http://schemas.microsoft.com/office/drawing/2014/main" id="{35D4FC90-1410-4989-A8E6-02A970B40FB3}"/>
+                  </a:ext>
+                </a:extLst>
+              </p14:cNvPr>
+              <p14:cNvContentPartPr/>
+              <p14:nvPr/>
+            </p14:nvContentPartPr>
+            <p14:xfrm>
+              <a:off x="494569" y="1960159"/>
+              <a:ext cx="209520" cy="111240"/>
+            </p14:xfrm>
+          </p:contentPart>
+        </mc:Choice>
+        <mc:Fallback>
+          <p:pic>
+            <p:nvPicPr>
+              <p:cNvPr id="6" name="Ink 5">
+                <a:extLst>
+                  <a:ext uri="{FF2B5EF4-FFF2-40B4-BE49-F238E27FC236}">
+                    <a16:creationId xmlns:a16="http://schemas.microsoft.com/office/drawing/2014/main" id="{35D4FC90-1410-4989-A8E6-02A970B40FB3}"/>
+                  </a:ext>
+                </a:extLst>
+              </p:cNvPr>
+              <p:cNvPicPr/>
+              <p:nvPr/>
+            </p:nvPicPr>
+            <p:blipFill>
+              <a:blip r:embed="rId7"/>
+              <a:stretch>
+                <a:fillRect/>
+              </a:stretch>
+            </p:blipFill>
+            <p:spPr>
+              <a:xfrm>
+                <a:off x="485569" y="1951159"/>
+                <a:ext cx="227160" cy="128880"/>
+              </a:xfrm>
+              <a:prstGeom prst="rect">
+                <a:avLst/>
+              </a:prstGeom>
+            </p:spPr>
+          </p:pic>
+        </mc:Fallback>
+      </mc:AlternateContent>
+      <p:grpSp>
+        <p:nvGrpSpPr>
+          <p:cNvPr id="20" name="Group 19">
+            <a:extLst>
+              <a:ext uri="{FF2B5EF4-FFF2-40B4-BE49-F238E27FC236}">
+                <a16:creationId xmlns:a16="http://schemas.microsoft.com/office/drawing/2014/main" id="{7293EBFB-BE73-4301-AE9D-1DAB5E76743F}"/>
+              </a:ext>
+            </a:extLst>
+          </p:cNvPr>
+          <p:cNvGrpSpPr/>
+          <p:nvPr/>
+        </p:nvGrpSpPr>
+        <p:grpSpPr>
+          <a:xfrm>
+            <a:off x="1471609" y="2926039"/>
+            <a:ext cx="868680" cy="268200"/>
+            <a:chOff x="1471609" y="2926039"/>
+            <a:chExt cx="868680" cy="268200"/>
+          </a:xfrm>
+        </p:grpSpPr>
+        <mc:AlternateContent xmlns:mc="http://schemas.openxmlformats.org/markup-compatibility/2006">
+          <mc:Choice xmlns:p14="http://schemas.microsoft.com/office/powerpoint/2010/main" Requires="p14">
+            <p:contentPart p14:bwMode="auto" r:id="rId8">
+              <p14:nvContentPartPr>
+                <p14:cNvPr id="7" name="Ink 6">
+                  <a:extLst>
+                    <a:ext uri="{FF2B5EF4-FFF2-40B4-BE49-F238E27FC236}">
+                      <a16:creationId xmlns:a16="http://schemas.microsoft.com/office/drawing/2014/main" id="{3655055C-DC01-43C9-85C6-9A45DF796E17}"/>
+                    </a:ext>
+                  </a:extLst>
+                </p14:cNvPr>
+                <p14:cNvContentPartPr/>
+                <p14:nvPr/>
+              </p14:nvContentPartPr>
+              <p14:xfrm>
+                <a:off x="1471609" y="2945839"/>
+                <a:ext cx="212760" cy="248400"/>
+              </p14:xfrm>
+            </p:contentPart>
+          </mc:Choice>
+          <mc:Fallback>
+            <p:pic>
+              <p:nvPicPr>
+                <p:cNvPr id="7" name="Ink 6">
+                  <a:extLst>
+                    <a:ext uri="{FF2B5EF4-FFF2-40B4-BE49-F238E27FC236}">
+                      <a16:creationId xmlns:a16="http://schemas.microsoft.com/office/drawing/2014/main" id="{3655055C-DC01-43C9-85C6-9A45DF796E17}"/>
+                    </a:ext>
+                  </a:extLst>
+                </p:cNvPr>
+                <p:cNvPicPr/>
+                <p:nvPr/>
+              </p:nvPicPr>
+              <p:blipFill>
+                <a:blip r:embed="rId9"/>
+                <a:stretch>
+                  <a:fillRect/>
+                </a:stretch>
+              </p:blipFill>
+              <p:spPr>
+                <a:xfrm>
+                  <a:off x="1462609" y="2936839"/>
+                  <a:ext cx="230400" cy="266040"/>
+                </a:xfrm>
+                <a:prstGeom prst="rect">
+                  <a:avLst/>
+                </a:prstGeom>
+              </p:spPr>
+            </p:pic>
+          </mc:Fallback>
+        </mc:AlternateContent>
+        <mc:AlternateContent xmlns:mc="http://schemas.openxmlformats.org/markup-compatibility/2006">
+          <mc:Choice xmlns:p14="http://schemas.microsoft.com/office/powerpoint/2010/main" Requires="p14">
+            <p:contentPart p14:bwMode="auto" r:id="rId10">
+              <p14:nvContentPartPr>
+                <p14:cNvPr id="8" name="Ink 7">
+                  <a:extLst>
+                    <a:ext uri="{FF2B5EF4-FFF2-40B4-BE49-F238E27FC236}">
+                      <a16:creationId xmlns:a16="http://schemas.microsoft.com/office/drawing/2014/main" id="{7127F810-A250-4443-950E-EAECA014632D}"/>
+                    </a:ext>
+                  </a:extLst>
+                </p14:cNvPr>
+                <p14:cNvContentPartPr/>
+                <p14:nvPr/>
+              </p14:nvContentPartPr>
+              <p14:xfrm>
+                <a:off x="1752049" y="2929639"/>
+                <a:ext cx="141120" cy="40680"/>
+              </p14:xfrm>
+            </p:contentPart>
+          </mc:Choice>
+          <mc:Fallback>
+            <p:pic>
+              <p:nvPicPr>
+                <p:cNvPr id="8" name="Ink 7">
+                  <a:extLst>
+                    <a:ext uri="{FF2B5EF4-FFF2-40B4-BE49-F238E27FC236}">
+                      <a16:creationId xmlns:a16="http://schemas.microsoft.com/office/drawing/2014/main" id="{7127F810-A250-4443-950E-EAECA014632D}"/>
+                    </a:ext>
+                  </a:extLst>
+                </p:cNvPr>
+                <p:cNvPicPr/>
+                <p:nvPr/>
+              </p:nvPicPr>
+              <p:blipFill>
+                <a:blip r:embed="rId11"/>
+                <a:stretch>
+                  <a:fillRect/>
+                </a:stretch>
+              </p:blipFill>
+              <p:spPr>
+                <a:xfrm>
+                  <a:off x="1743049" y="2920639"/>
+                  <a:ext cx="158760" cy="58320"/>
+                </a:xfrm>
+                <a:prstGeom prst="rect">
+                  <a:avLst/>
+                </a:prstGeom>
+              </p:spPr>
+            </p:pic>
+          </mc:Fallback>
+        </mc:AlternateContent>
+        <mc:AlternateContent xmlns:mc="http://schemas.openxmlformats.org/markup-compatibility/2006">
+          <mc:Choice xmlns:p14="http://schemas.microsoft.com/office/powerpoint/2010/main" Requires="p14">
+            <p:contentPart p14:bwMode="auto" r:id="rId12">
+              <p14:nvContentPartPr>
+                <p14:cNvPr id="9" name="Ink 8">
+                  <a:extLst>
+                    <a:ext uri="{FF2B5EF4-FFF2-40B4-BE49-F238E27FC236}">
+                      <a16:creationId xmlns:a16="http://schemas.microsoft.com/office/drawing/2014/main" id="{01B8B6BA-D9A0-4D5E-8B70-1C5CAE858123}"/>
+                    </a:ext>
+                  </a:extLst>
+                </p14:cNvPr>
+                <p14:cNvContentPartPr/>
+                <p14:nvPr/>
+              </p14:nvContentPartPr>
+              <p14:xfrm>
+                <a:off x="1777249" y="2953039"/>
+                <a:ext cx="113760" cy="188280"/>
+              </p14:xfrm>
+            </p:contentPart>
+          </mc:Choice>
+          <mc:Fallback>
+            <p:pic>
+              <p:nvPicPr>
+                <p:cNvPr id="9" name="Ink 8">
+                  <a:extLst>
+                    <a:ext uri="{FF2B5EF4-FFF2-40B4-BE49-F238E27FC236}">
+                      <a16:creationId xmlns:a16="http://schemas.microsoft.com/office/drawing/2014/main" id="{01B8B6BA-D9A0-4D5E-8B70-1C5CAE858123}"/>
+                    </a:ext>
+                  </a:extLst>
+                </p:cNvPr>
+                <p:cNvPicPr/>
+                <p:nvPr/>
+              </p:nvPicPr>
+              <p:blipFill>
+                <a:blip r:embed="rId13"/>
+                <a:stretch>
+                  <a:fillRect/>
+                </a:stretch>
+              </p:blipFill>
+              <p:spPr>
+                <a:xfrm>
+                  <a:off x="1768609" y="2944399"/>
+                  <a:ext cx="131400" cy="205920"/>
+                </a:xfrm>
+                <a:prstGeom prst="rect">
+                  <a:avLst/>
+                </a:prstGeom>
+              </p:spPr>
+            </p:pic>
+          </mc:Fallback>
+        </mc:AlternateContent>
+        <mc:AlternateContent xmlns:mc="http://schemas.openxmlformats.org/markup-compatibility/2006">
+          <mc:Choice xmlns:p14="http://schemas.microsoft.com/office/powerpoint/2010/main" Requires="p14">
+            <p:contentPart p14:bwMode="auto" r:id="rId14">
+              <p14:nvContentPartPr>
+                <p14:cNvPr id="10" name="Ink 9">
+                  <a:extLst>
+                    <a:ext uri="{FF2B5EF4-FFF2-40B4-BE49-F238E27FC236}">
+                      <a16:creationId xmlns:a16="http://schemas.microsoft.com/office/drawing/2014/main" id="{DAE85653-2ED2-4676-B783-AC834A9655B0}"/>
+                    </a:ext>
+                  </a:extLst>
+                </p14:cNvPr>
+                <p14:cNvContentPartPr/>
+                <p14:nvPr/>
+              </p14:nvContentPartPr>
+              <p14:xfrm>
+                <a:off x="1955089" y="3043759"/>
+                <a:ext cx="174240" cy="88920"/>
+              </p14:xfrm>
+            </p:contentPart>
+          </mc:Choice>
+          <mc:Fallback>
+            <p:pic>
+              <p:nvPicPr>
+                <p:cNvPr id="10" name="Ink 9">
+                  <a:extLst>
+                    <a:ext uri="{FF2B5EF4-FFF2-40B4-BE49-F238E27FC236}">
+                      <a16:creationId xmlns:a16="http://schemas.microsoft.com/office/drawing/2014/main" id="{DAE85653-2ED2-4676-B783-AC834A9655B0}"/>
+                    </a:ext>
+                  </a:extLst>
+                </p:cNvPr>
+                <p:cNvPicPr/>
+                <p:nvPr/>
+              </p:nvPicPr>
+              <p:blipFill>
+                <a:blip r:embed="rId15"/>
+                <a:stretch>
+                  <a:fillRect/>
+                </a:stretch>
+              </p:blipFill>
+              <p:spPr>
+                <a:xfrm>
+                  <a:off x="1946089" y="3034759"/>
+                  <a:ext cx="191880" cy="106560"/>
+                </a:xfrm>
+                <a:prstGeom prst="rect">
+                  <a:avLst/>
+                </a:prstGeom>
+              </p:spPr>
+            </p:pic>
+          </mc:Fallback>
+        </mc:AlternateContent>
+        <mc:AlternateContent xmlns:mc="http://schemas.openxmlformats.org/markup-compatibility/2006">
+          <mc:Choice xmlns:p14="http://schemas.microsoft.com/office/powerpoint/2010/main" Requires="p14">
+            <p:contentPart p14:bwMode="auto" r:id="rId16">
+              <p14:nvContentPartPr>
+                <p14:cNvPr id="11" name="Ink 10">
+                  <a:extLst>
+                    <a:ext uri="{FF2B5EF4-FFF2-40B4-BE49-F238E27FC236}">
+                      <a16:creationId xmlns:a16="http://schemas.microsoft.com/office/drawing/2014/main" id="{1A8161F0-28FC-4AE8-B2D5-4059200D58A1}"/>
+                    </a:ext>
+                  </a:extLst>
+                </p14:cNvPr>
+                <p14:cNvContentPartPr/>
+                <p14:nvPr/>
+              </p14:nvContentPartPr>
+              <p14:xfrm>
+                <a:off x="2151289" y="2926039"/>
+                <a:ext cx="103680" cy="205560"/>
+              </p14:xfrm>
+            </p:contentPart>
+          </mc:Choice>
+          <mc:Fallback>
+            <p:pic>
+              <p:nvPicPr>
+                <p:cNvPr id="11" name="Ink 10">
+                  <a:extLst>
+                    <a:ext uri="{FF2B5EF4-FFF2-40B4-BE49-F238E27FC236}">
+                      <a16:creationId xmlns:a16="http://schemas.microsoft.com/office/drawing/2014/main" id="{1A8161F0-28FC-4AE8-B2D5-4059200D58A1}"/>
+                    </a:ext>
+                  </a:extLst>
+                </p:cNvPr>
+                <p:cNvPicPr/>
+                <p:nvPr/>
+              </p:nvPicPr>
+              <p:blipFill>
+                <a:blip r:embed="rId17"/>
+                <a:stretch>
+                  <a:fillRect/>
+                </a:stretch>
+              </p:blipFill>
+              <p:spPr>
+                <a:xfrm>
+                  <a:off x="2142649" y="2917399"/>
+                  <a:ext cx="121320" cy="223200"/>
+                </a:xfrm>
+                <a:prstGeom prst="rect">
+                  <a:avLst/>
+                </a:prstGeom>
+              </p:spPr>
+            </p:pic>
+          </mc:Fallback>
+        </mc:AlternateContent>
+        <mc:AlternateContent xmlns:mc="http://schemas.openxmlformats.org/markup-compatibility/2006">
+          <mc:Choice xmlns:p14="http://schemas.microsoft.com/office/powerpoint/2010/main" Requires="p14">
+            <p:contentPart p14:bwMode="auto" r:id="rId18">
+              <p14:nvContentPartPr>
+                <p14:cNvPr id="12" name="Ink 11">
+                  <a:extLst>
+                    <a:ext uri="{FF2B5EF4-FFF2-40B4-BE49-F238E27FC236}">
+                      <a16:creationId xmlns:a16="http://schemas.microsoft.com/office/drawing/2014/main" id="{F2E3A40D-BC77-493F-AB4F-3171F76E805F}"/>
+                    </a:ext>
+                  </a:extLst>
+                </p14:cNvPr>
+                <p14:cNvContentPartPr/>
+                <p14:nvPr/>
+              </p14:nvContentPartPr>
+              <p14:xfrm>
+                <a:off x="2269009" y="3061399"/>
+                <a:ext cx="71280" cy="60840"/>
+              </p14:xfrm>
+            </p:contentPart>
+          </mc:Choice>
+          <mc:Fallback>
+            <p:pic>
+              <p:nvPicPr>
+                <p:cNvPr id="12" name="Ink 11">
+                  <a:extLst>
+                    <a:ext uri="{FF2B5EF4-FFF2-40B4-BE49-F238E27FC236}">
+                      <a16:creationId xmlns:a16="http://schemas.microsoft.com/office/drawing/2014/main" id="{F2E3A40D-BC77-493F-AB4F-3171F76E805F}"/>
+                    </a:ext>
+                  </a:extLst>
+                </p:cNvPr>
+                <p:cNvPicPr/>
+                <p:nvPr/>
+              </p:nvPicPr>
+              <p:blipFill>
+                <a:blip r:embed="rId19"/>
+                <a:stretch>
+                  <a:fillRect/>
+                </a:stretch>
+              </p:blipFill>
+              <p:spPr>
+                <a:xfrm>
+                  <a:off x="2260369" y="3052399"/>
+                  <a:ext cx="88920" cy="78480"/>
+                </a:xfrm>
+                <a:prstGeom prst="rect">
+                  <a:avLst/>
+                </a:prstGeom>
+              </p:spPr>
+            </p:pic>
+          </mc:Fallback>
+        </mc:AlternateContent>
+      </p:grpSp>
+      <mc:AlternateContent xmlns:mc="http://schemas.openxmlformats.org/markup-compatibility/2006">
+        <mc:Choice xmlns:p14="http://schemas.microsoft.com/office/powerpoint/2010/main" Requires="p14">
+          <p:contentPart p14:bwMode="auto" r:id="rId20">
+            <p14:nvContentPartPr>
+              <p14:cNvPr id="13" name="Ink 12">
+                <a:extLst>
+                  <a:ext uri="{FF2B5EF4-FFF2-40B4-BE49-F238E27FC236}">
+                    <a16:creationId xmlns:a16="http://schemas.microsoft.com/office/drawing/2014/main" id="{8C96F8E6-0FCE-420D-AB13-A3C32F24DA16}"/>
+                  </a:ext>
+                </a:extLst>
+              </p14:cNvPr>
+              <p14:cNvContentPartPr/>
+              <p14:nvPr/>
+            </p14:nvContentPartPr>
+            <p14:xfrm>
+              <a:off x="2559169" y="3024319"/>
+              <a:ext cx="93600" cy="16560"/>
+            </p14:xfrm>
+          </p:contentPart>
+        </mc:Choice>
+        <mc:Fallback>
+          <p:pic>
+            <p:nvPicPr>
+              <p:cNvPr id="13" name="Ink 12">
+                <a:extLst>
+                  <a:ext uri="{FF2B5EF4-FFF2-40B4-BE49-F238E27FC236}">
+                    <a16:creationId xmlns:a16="http://schemas.microsoft.com/office/drawing/2014/main" id="{8C96F8E6-0FCE-420D-AB13-A3C32F24DA16}"/>
+                  </a:ext>
+                </a:extLst>
+              </p:cNvPr>
+              <p:cNvPicPr/>
+              <p:nvPr/>
+            </p:nvPicPr>
+            <p:blipFill>
+              <a:blip r:embed="rId21"/>
+              <a:stretch>
+                <a:fillRect/>
+              </a:stretch>
+            </p:blipFill>
+            <p:spPr>
+              <a:xfrm>
+                <a:off x="2550169" y="3015319"/>
+                <a:ext cx="111240" cy="34200"/>
+              </a:xfrm>
+              <a:prstGeom prst="rect">
+                <a:avLst/>
+              </a:prstGeom>
+            </p:spPr>
+          </p:pic>
+        </mc:Fallback>
+      </mc:AlternateContent>
+      <p:grpSp>
+        <p:nvGrpSpPr>
+          <p:cNvPr id="19" name="Group 18">
+            <a:extLst>
+              <a:ext uri="{FF2B5EF4-FFF2-40B4-BE49-F238E27FC236}">
+                <a16:creationId xmlns:a16="http://schemas.microsoft.com/office/drawing/2014/main" id="{C70F97D6-44E3-45B8-A452-F4B553930601}"/>
+              </a:ext>
+            </a:extLst>
+          </p:cNvPr>
+          <p:cNvGrpSpPr/>
+          <p:nvPr/>
+        </p:nvGrpSpPr>
+        <p:grpSpPr>
+          <a:xfrm>
+            <a:off x="2914129" y="2844679"/>
+            <a:ext cx="685440" cy="253440"/>
+            <a:chOff x="2914129" y="2844679"/>
+            <a:chExt cx="685440" cy="253440"/>
+          </a:xfrm>
+        </p:grpSpPr>
+        <mc:AlternateContent xmlns:mc="http://schemas.openxmlformats.org/markup-compatibility/2006">
+          <mc:Choice xmlns:p14="http://schemas.microsoft.com/office/powerpoint/2010/main" Requires="p14">
+            <p:contentPart p14:bwMode="auto" r:id="rId22">
+              <p14:nvContentPartPr>
+                <p14:cNvPr id="14" name="Ink 13">
+                  <a:extLst>
+                    <a:ext uri="{FF2B5EF4-FFF2-40B4-BE49-F238E27FC236}">
+                      <a16:creationId xmlns:a16="http://schemas.microsoft.com/office/drawing/2014/main" id="{53BB78EC-7903-4CE5-B24A-9AE907476232}"/>
+                    </a:ext>
+                  </a:extLst>
+                </p14:cNvPr>
+                <p14:cNvContentPartPr/>
+                <p14:nvPr/>
+              </p14:nvContentPartPr>
+              <p14:xfrm>
+                <a:off x="2914129" y="2860159"/>
+                <a:ext cx="105120" cy="237960"/>
+              </p14:xfrm>
+            </p:contentPart>
+          </mc:Choice>
+          <mc:Fallback>
+            <p:pic>
+              <p:nvPicPr>
+                <p:cNvPr id="14" name="Ink 13">
+                  <a:extLst>
+                    <a:ext uri="{FF2B5EF4-FFF2-40B4-BE49-F238E27FC236}">
+                      <a16:creationId xmlns:a16="http://schemas.microsoft.com/office/drawing/2014/main" id="{53BB78EC-7903-4CE5-B24A-9AE907476232}"/>
+                    </a:ext>
+                  </a:extLst>
+                </p:cNvPr>
+                <p:cNvPicPr/>
+                <p:nvPr/>
+              </p:nvPicPr>
+              <p:blipFill>
+                <a:blip r:embed="rId23"/>
+                <a:stretch>
+                  <a:fillRect/>
+                </a:stretch>
+              </p:blipFill>
+              <p:spPr>
+                <a:xfrm>
+                  <a:off x="2905489" y="2851519"/>
+                  <a:ext cx="122760" cy="255600"/>
+                </a:xfrm>
+                <a:prstGeom prst="rect">
+                  <a:avLst/>
+                </a:prstGeom>
+              </p:spPr>
+            </p:pic>
+          </mc:Fallback>
+        </mc:AlternateContent>
+        <mc:AlternateContent xmlns:mc="http://schemas.openxmlformats.org/markup-compatibility/2006">
+          <mc:Choice xmlns:p14="http://schemas.microsoft.com/office/powerpoint/2010/main" Requires="p14">
+            <p:contentPart p14:bwMode="auto" r:id="rId24">
+              <p14:nvContentPartPr>
+                <p14:cNvPr id="15" name="Ink 14">
+                  <a:extLst>
+                    <a:ext uri="{FF2B5EF4-FFF2-40B4-BE49-F238E27FC236}">
+                      <a16:creationId xmlns:a16="http://schemas.microsoft.com/office/drawing/2014/main" id="{1C677B76-C3D1-4DDC-B762-4F672D198B70}"/>
+                    </a:ext>
+                  </a:extLst>
+                </p14:cNvPr>
+                <p14:cNvContentPartPr/>
+                <p14:nvPr/>
+              </p14:nvContentPartPr>
+              <p14:xfrm>
+                <a:off x="3039769" y="2879239"/>
+                <a:ext cx="103320" cy="160560"/>
+              </p14:xfrm>
+            </p:contentPart>
+          </mc:Choice>
+          <mc:Fallback>
+            <p:pic>
+              <p:nvPicPr>
+                <p:cNvPr id="15" name="Ink 14">
+                  <a:extLst>
+                    <a:ext uri="{FF2B5EF4-FFF2-40B4-BE49-F238E27FC236}">
+                      <a16:creationId xmlns:a16="http://schemas.microsoft.com/office/drawing/2014/main" id="{1C677B76-C3D1-4DDC-B762-4F672D198B70}"/>
+                    </a:ext>
+                  </a:extLst>
+                </p:cNvPr>
+                <p:cNvPicPr/>
+                <p:nvPr/>
+              </p:nvPicPr>
+              <p:blipFill>
+                <a:blip r:embed="rId25"/>
+                <a:stretch>
+                  <a:fillRect/>
+                </a:stretch>
+              </p:blipFill>
+              <p:spPr>
+                <a:xfrm>
+                  <a:off x="3031129" y="2870239"/>
+                  <a:ext cx="120960" cy="178200"/>
+                </a:xfrm>
+                <a:prstGeom prst="rect">
+                  <a:avLst/>
+                </a:prstGeom>
+              </p:spPr>
+            </p:pic>
+          </mc:Fallback>
+        </mc:AlternateContent>
+        <mc:AlternateContent xmlns:mc="http://schemas.openxmlformats.org/markup-compatibility/2006">
+          <mc:Choice xmlns:p14="http://schemas.microsoft.com/office/powerpoint/2010/main" Requires="p14">
+            <p:contentPart p14:bwMode="auto" r:id="rId26">
+              <p14:nvContentPartPr>
+                <p14:cNvPr id="16" name="Ink 15">
+                  <a:extLst>
+                    <a:ext uri="{FF2B5EF4-FFF2-40B4-BE49-F238E27FC236}">
+                      <a16:creationId xmlns:a16="http://schemas.microsoft.com/office/drawing/2014/main" id="{19A40255-9F3B-4530-BD6E-78A2B752E1C3}"/>
+                    </a:ext>
+                  </a:extLst>
+                </p14:cNvPr>
+                <p14:cNvContentPartPr/>
+                <p14:nvPr/>
+              </p14:nvContentPartPr>
+              <p14:xfrm>
+                <a:off x="3212929" y="3003799"/>
+                <a:ext cx="163080" cy="80280"/>
+              </p14:xfrm>
+            </p:contentPart>
+          </mc:Choice>
+          <mc:Fallback>
+            <p:pic>
+              <p:nvPicPr>
+                <p:cNvPr id="16" name="Ink 15">
+                  <a:extLst>
+                    <a:ext uri="{FF2B5EF4-FFF2-40B4-BE49-F238E27FC236}">
+                      <a16:creationId xmlns:a16="http://schemas.microsoft.com/office/drawing/2014/main" id="{19A40255-9F3B-4530-BD6E-78A2B752E1C3}"/>
+                    </a:ext>
+                  </a:extLst>
+                </p:cNvPr>
+                <p:cNvPicPr/>
+                <p:nvPr/>
+              </p:nvPicPr>
+              <p:blipFill>
+                <a:blip r:embed="rId27"/>
+                <a:stretch>
+                  <a:fillRect/>
+                </a:stretch>
+              </p:blipFill>
+              <p:spPr>
+                <a:xfrm>
+                  <a:off x="3203929" y="2994799"/>
+                  <a:ext cx="180720" cy="97920"/>
+                </a:xfrm>
+                <a:prstGeom prst="rect">
+                  <a:avLst/>
+                </a:prstGeom>
+              </p:spPr>
+            </p:pic>
+          </mc:Fallback>
+        </mc:AlternateContent>
+        <mc:AlternateContent xmlns:mc="http://schemas.openxmlformats.org/markup-compatibility/2006">
+          <mc:Choice xmlns:p14="http://schemas.microsoft.com/office/powerpoint/2010/main" Requires="p14">
+            <p:contentPart p14:bwMode="auto" r:id="rId28">
+              <p14:nvContentPartPr>
+                <p14:cNvPr id="17" name="Ink 16">
+                  <a:extLst>
+                    <a:ext uri="{FF2B5EF4-FFF2-40B4-BE49-F238E27FC236}">
+                      <a16:creationId xmlns:a16="http://schemas.microsoft.com/office/drawing/2014/main" id="{C62BDBDD-1816-405C-84D4-E8A68F1F81E3}"/>
+                    </a:ext>
+                  </a:extLst>
+                </p14:cNvPr>
+                <p14:cNvContentPartPr/>
+                <p14:nvPr/>
+              </p14:nvContentPartPr>
+              <p14:xfrm>
+                <a:off x="3423889" y="2844679"/>
+                <a:ext cx="81360" cy="240840"/>
+              </p14:xfrm>
+            </p:contentPart>
+          </mc:Choice>
+          <mc:Fallback>
+            <p:pic>
+              <p:nvPicPr>
+                <p:cNvPr id="17" name="Ink 16">
+                  <a:extLst>
+                    <a:ext uri="{FF2B5EF4-FFF2-40B4-BE49-F238E27FC236}">
+                      <a16:creationId xmlns:a16="http://schemas.microsoft.com/office/drawing/2014/main" id="{C62BDBDD-1816-405C-84D4-E8A68F1F81E3}"/>
+                    </a:ext>
+                  </a:extLst>
+                </p:cNvPr>
+                <p:cNvPicPr/>
+                <p:nvPr/>
+              </p:nvPicPr>
+              <p:blipFill>
+                <a:blip r:embed="rId29"/>
+                <a:stretch>
+                  <a:fillRect/>
+                </a:stretch>
+              </p:blipFill>
+              <p:spPr>
+                <a:xfrm>
+                  <a:off x="3414889" y="2836039"/>
+                  <a:ext cx="99000" cy="258480"/>
+                </a:xfrm>
+                <a:prstGeom prst="rect">
+                  <a:avLst/>
+                </a:prstGeom>
+              </p:spPr>
+            </p:pic>
+          </mc:Fallback>
+        </mc:AlternateContent>
+        <mc:AlternateContent xmlns:mc="http://schemas.openxmlformats.org/markup-compatibility/2006">
+          <mc:Choice xmlns:p14="http://schemas.microsoft.com/office/powerpoint/2010/main" Requires="p14">
+            <p:contentPart p14:bwMode="auto" r:id="rId30">
+              <p14:nvContentPartPr>
+                <p14:cNvPr id="18" name="Ink 17">
+                  <a:extLst>
+                    <a:ext uri="{FF2B5EF4-FFF2-40B4-BE49-F238E27FC236}">
+                      <a16:creationId xmlns:a16="http://schemas.microsoft.com/office/drawing/2014/main" id="{64A6B4E8-C58B-4E8A-B1EF-1BE03F7E44C8}"/>
+                    </a:ext>
+                  </a:extLst>
+                </p14:cNvPr>
+                <p14:cNvContentPartPr/>
+                <p14:nvPr/>
+              </p14:nvContentPartPr>
+              <p14:xfrm>
+                <a:off x="3505969" y="2956639"/>
+                <a:ext cx="93600" cy="100440"/>
+              </p14:xfrm>
+            </p:contentPart>
+          </mc:Choice>
+          <mc:Fallback>
+            <p:pic>
+              <p:nvPicPr>
+                <p:cNvPr id="18" name="Ink 17">
+                  <a:extLst>
+                    <a:ext uri="{FF2B5EF4-FFF2-40B4-BE49-F238E27FC236}">
+                      <a16:creationId xmlns:a16="http://schemas.microsoft.com/office/drawing/2014/main" id="{64A6B4E8-C58B-4E8A-B1EF-1BE03F7E44C8}"/>
+                    </a:ext>
+                  </a:extLst>
+                </p:cNvPr>
+                <p:cNvPicPr/>
+                <p:nvPr/>
+              </p:nvPicPr>
+              <p:blipFill>
+                <a:blip r:embed="rId31"/>
+                <a:stretch>
+                  <a:fillRect/>
+                </a:stretch>
+              </p:blipFill>
+              <p:spPr>
+                <a:xfrm>
+                  <a:off x="3496969" y="2947639"/>
+                  <a:ext cx="111240" cy="118080"/>
+                </a:xfrm>
+                <a:prstGeom prst="rect">
+                  <a:avLst/>
+                </a:prstGeom>
+              </p:spPr>
+            </p:pic>
+          </mc:Fallback>
+        </mc:AlternateContent>
+      </p:grpSp>
     </p:spTree>
     <p:extLst>
       <p:ext uri="{BB962C8B-B14F-4D97-AF65-F5344CB8AC3E}">
@@ -4446,31 +6067,9 @@
         </p:spPr>
         <p:txBody>
           <a:bodyPr>
-            <a:normAutofit fontScale="92500" lnSpcReduction="20000"/>
+            <a:normAutofit/>
           </a:bodyPr>
           <a:lstStyle/>
-          <a:p>
-            <a:r>
-              <a:rPr lang="en-US" dirty="0"/>
-              <a:t>Given a string, return the sum of the numbers appearing in the string, ignoring all other characters. A number is a series of 1 or more digit chars in a row. (Note: </a:t>
-            </a:r>
-            <a:r>
-              <a:rPr lang="en-US" dirty="0" err="1"/>
-              <a:t>Character.isDigit</a:t>
-            </a:r>
-            <a:r>
-              <a:rPr lang="en-US" dirty="0"/>
-              <a:t>(char) tests if a char is one of the chars '0', '1', .. '9'. </a:t>
-            </a:r>
-            <a:r>
-              <a:rPr lang="en-US" dirty="0" err="1"/>
-              <a:t>Integer.parseInt</a:t>
-            </a:r>
-            <a:r>
-              <a:rPr lang="en-US" dirty="0"/>
-              <a:t>(string) converts a string to an int.)</a:t>
-            </a:r>
-          </a:p>
           <a:p>
             <a:r>
               <a:rPr lang="en-US" dirty="0"/>

</xml_diff>